<commit_message>
[0.0.7][ML]Digit Recognition Reset Point
</commit_message>
<xml_diff>
--- a/MachineLearning/MyTests/NaiveBayes/Clasificación de texto.pptx
+++ b/MachineLearning/MyTests/NaiveBayes/Clasificación de texto.pptx
@@ -9,6 +9,9 @@
     <p:sldId id="257" r:id="rId3"/>
     <p:sldId id="258" r:id="rId4"/>
     <p:sldId id="259" r:id="rId5"/>
+    <p:sldId id="260" r:id="rId6"/>
+    <p:sldId id="261" r:id="rId7"/>
+    <p:sldId id="262" r:id="rId8"/>
   </p:sldIdLst>
   <p:sldSz cx="12192000" cy="6858000"/>
   <p:notesSz cx="6858000" cy="9144000"/>
@@ -107,7 +110,1810 @@
       </a:defRPr>
     </a:lvl9pPr>
   </p:defaultTextStyle>
+  <p:extLst>
+    <p:ext uri="{EFAFB233-063F-42B5-8137-9DF3F51BA10A}">
+      <p15:sldGuideLst xmlns:p15="http://schemas.microsoft.com/office/powerpoint/2012/main"/>
+    </p:ext>
+  </p:extLst>
 </p:presentation>
+</file>
+
+<file path=ppt/changesInfos/changesInfo1.xml><?xml version="1.0" encoding="utf-8"?>
+<pc:chgInfo xmlns:a="http://schemas.openxmlformats.org/drawingml/2006/main" xmlns:r="http://schemas.openxmlformats.org/officeDocument/2006/relationships" xmlns:ac="http://schemas.microsoft.com/office/drawing/2013/main/command" xmlns:pc="http://schemas.microsoft.com/office/powerpoint/2013/main/command">
+  <pc:docChgLst>
+    <pc:chgData name="Calatayud Trescoli, Carles" userId="112b7921-b0d3-45b1-9c58-8e0889f16e85" providerId="ADAL" clId="{E183D40F-2FAB-4EBB-87AC-D7C1AB9CDFCF}"/>
+    <pc:docChg chg="undo custSel addSld modSld">
+      <pc:chgData name="Calatayud Trescoli, Carles" userId="112b7921-b0d3-45b1-9c58-8e0889f16e85" providerId="ADAL" clId="{E183D40F-2FAB-4EBB-87AC-D7C1AB9CDFCF}" dt="2022-07-26T12:58:43.617" v="1284" actId="14100"/>
+      <pc:docMkLst>
+        <pc:docMk/>
+      </pc:docMkLst>
+      <pc:sldChg chg="modSp mod">
+        <pc:chgData name="Calatayud Trescoli, Carles" userId="112b7921-b0d3-45b1-9c58-8e0889f16e85" providerId="ADAL" clId="{E183D40F-2FAB-4EBB-87AC-D7C1AB9CDFCF}" dt="2022-07-26T12:10:00.192" v="552" actId="20577"/>
+        <pc:sldMkLst>
+          <pc:docMk/>
+          <pc:sldMk cId="2267657002" sldId="257"/>
+        </pc:sldMkLst>
+        <pc:spChg chg="mod">
+          <ac:chgData name="Calatayud Trescoli, Carles" userId="112b7921-b0d3-45b1-9c58-8e0889f16e85" providerId="ADAL" clId="{E183D40F-2FAB-4EBB-87AC-D7C1AB9CDFCF}" dt="2022-07-26T12:10:00.192" v="552" actId="20577"/>
+          <ac:spMkLst>
+            <pc:docMk/>
+            <pc:sldMk cId="2267657002" sldId="257"/>
+            <ac:spMk id="3" creationId="{CFAFE7CA-002D-3781-95FE-9ABEC59B2CF7}"/>
+          </ac:spMkLst>
+        </pc:spChg>
+      </pc:sldChg>
+      <pc:sldChg chg="modSp mod">
+        <pc:chgData name="Calatayud Trescoli, Carles" userId="112b7921-b0d3-45b1-9c58-8e0889f16e85" providerId="ADAL" clId="{E183D40F-2FAB-4EBB-87AC-D7C1AB9CDFCF}" dt="2022-07-22T06:57:44.102" v="342" actId="20577"/>
+        <pc:sldMkLst>
+          <pc:docMk/>
+          <pc:sldMk cId="2634120822" sldId="259"/>
+        </pc:sldMkLst>
+        <pc:spChg chg="mod">
+          <ac:chgData name="Calatayud Trescoli, Carles" userId="112b7921-b0d3-45b1-9c58-8e0889f16e85" providerId="ADAL" clId="{E183D40F-2FAB-4EBB-87AC-D7C1AB9CDFCF}" dt="2022-07-22T06:57:44.102" v="342" actId="20577"/>
+          <ac:spMkLst>
+            <pc:docMk/>
+            <pc:sldMk cId="2634120822" sldId="259"/>
+            <ac:spMk id="3" creationId="{4932E500-AA1F-FB7A-3564-95D7DAA676ED}"/>
+          </ac:spMkLst>
+        </pc:spChg>
+      </pc:sldChg>
+      <pc:sldChg chg="addSp modSp add mod">
+        <pc:chgData name="Calatayud Trescoli, Carles" userId="112b7921-b0d3-45b1-9c58-8e0889f16e85" providerId="ADAL" clId="{E183D40F-2FAB-4EBB-87AC-D7C1AB9CDFCF}" dt="2022-07-26T12:13:46.917" v="569" actId="20577"/>
+        <pc:sldMkLst>
+          <pc:docMk/>
+          <pc:sldMk cId="4070933729" sldId="260"/>
+        </pc:sldMkLst>
+        <pc:spChg chg="mod">
+          <ac:chgData name="Calatayud Trescoli, Carles" userId="112b7921-b0d3-45b1-9c58-8e0889f16e85" providerId="ADAL" clId="{E183D40F-2FAB-4EBB-87AC-D7C1AB9CDFCF}" dt="2022-07-22T06:44:56.874" v="150" actId="20577"/>
+          <ac:spMkLst>
+            <pc:docMk/>
+            <pc:sldMk cId="4070933729" sldId="260"/>
+            <ac:spMk id="3" creationId="{4932E500-AA1F-FB7A-3564-95D7DAA676ED}"/>
+          </ac:spMkLst>
+        </pc:spChg>
+        <pc:spChg chg="add mod">
+          <ac:chgData name="Calatayud Trescoli, Carles" userId="112b7921-b0d3-45b1-9c58-8e0889f16e85" providerId="ADAL" clId="{E183D40F-2FAB-4EBB-87AC-D7C1AB9CDFCF}" dt="2022-07-26T12:13:46.917" v="569" actId="20577"/>
+          <ac:spMkLst>
+            <pc:docMk/>
+            <pc:sldMk cId="4070933729" sldId="260"/>
+            <ac:spMk id="4" creationId="{10FE8B53-3B83-4AC9-983E-07CF139B8E9E}"/>
+          </ac:spMkLst>
+        </pc:spChg>
+        <pc:spChg chg="add mod">
+          <ac:chgData name="Calatayud Trescoli, Carles" userId="112b7921-b0d3-45b1-9c58-8e0889f16e85" providerId="ADAL" clId="{E183D40F-2FAB-4EBB-87AC-D7C1AB9CDFCF}" dt="2022-07-22T06:56:42.241" v="225" actId="1076"/>
+          <ac:spMkLst>
+            <pc:docMk/>
+            <pc:sldMk cId="4070933729" sldId="260"/>
+            <ac:spMk id="6" creationId="{6202331B-78A7-4ACD-A2E9-312B46B437E0}"/>
+          </ac:spMkLst>
+        </pc:spChg>
+        <pc:picChg chg="add mod">
+          <ac:chgData name="Calatayud Trescoli, Carles" userId="112b7921-b0d3-45b1-9c58-8e0889f16e85" providerId="ADAL" clId="{E183D40F-2FAB-4EBB-87AC-D7C1AB9CDFCF}" dt="2022-07-22T07:35:01.563" v="431" actId="1076"/>
+          <ac:picMkLst>
+            <pc:docMk/>
+            <pc:sldMk cId="4070933729" sldId="260"/>
+            <ac:picMk id="5" creationId="{9059A484-10B1-4F0F-A5CB-4CFF026B21D6}"/>
+          </ac:picMkLst>
+        </pc:picChg>
+      </pc:sldChg>
+      <pc:sldChg chg="modSp new mod">
+        <pc:chgData name="Calatayud Trescoli, Carles" userId="112b7921-b0d3-45b1-9c58-8e0889f16e85" providerId="ADAL" clId="{E183D40F-2FAB-4EBB-87AC-D7C1AB9CDFCF}" dt="2022-07-26T12:25:45.446" v="1240" actId="20577"/>
+        <pc:sldMkLst>
+          <pc:docMk/>
+          <pc:sldMk cId="131332469" sldId="261"/>
+        </pc:sldMkLst>
+        <pc:spChg chg="mod">
+          <ac:chgData name="Calatayud Trescoli, Carles" userId="112b7921-b0d3-45b1-9c58-8e0889f16e85" providerId="ADAL" clId="{E183D40F-2FAB-4EBB-87AC-D7C1AB9CDFCF}" dt="2022-07-26T12:14:10.865" v="602" actId="20577"/>
+          <ac:spMkLst>
+            <pc:docMk/>
+            <pc:sldMk cId="131332469" sldId="261"/>
+            <ac:spMk id="2" creationId="{34945F48-44C1-4318-950F-71F889350CD3}"/>
+          </ac:spMkLst>
+        </pc:spChg>
+        <pc:spChg chg="mod">
+          <ac:chgData name="Calatayud Trescoli, Carles" userId="112b7921-b0d3-45b1-9c58-8e0889f16e85" providerId="ADAL" clId="{E183D40F-2FAB-4EBB-87AC-D7C1AB9CDFCF}" dt="2022-07-26T12:25:45.446" v="1240" actId="20577"/>
+          <ac:spMkLst>
+            <pc:docMk/>
+            <pc:sldMk cId="131332469" sldId="261"/>
+            <ac:spMk id="3" creationId="{9A7EEF91-EB71-458D-96D6-313A37F9798D}"/>
+          </ac:spMkLst>
+        </pc:spChg>
+      </pc:sldChg>
+      <pc:sldChg chg="addSp delSp modSp new mod setBg">
+        <pc:chgData name="Calatayud Trescoli, Carles" userId="112b7921-b0d3-45b1-9c58-8e0889f16e85" providerId="ADAL" clId="{E183D40F-2FAB-4EBB-87AC-D7C1AB9CDFCF}" dt="2022-07-26T12:58:43.617" v="1284" actId="14100"/>
+        <pc:sldMkLst>
+          <pc:docMk/>
+          <pc:sldMk cId="3784313263" sldId="262"/>
+        </pc:sldMkLst>
+        <pc:spChg chg="mod">
+          <ac:chgData name="Calatayud Trescoli, Carles" userId="112b7921-b0d3-45b1-9c58-8e0889f16e85" providerId="ADAL" clId="{E183D40F-2FAB-4EBB-87AC-D7C1AB9CDFCF}" dt="2022-07-26T12:57:10.338" v="1267" actId="27636"/>
+          <ac:spMkLst>
+            <pc:docMk/>
+            <pc:sldMk cId="3784313263" sldId="262"/>
+            <ac:spMk id="2" creationId="{E4127E96-0A87-48E2-8AF7-35DAF7183833}"/>
+          </ac:spMkLst>
+        </pc:spChg>
+        <pc:spChg chg="del mod">
+          <ac:chgData name="Calatayud Trescoli, Carles" userId="112b7921-b0d3-45b1-9c58-8e0889f16e85" providerId="ADAL" clId="{E183D40F-2FAB-4EBB-87AC-D7C1AB9CDFCF}" dt="2022-07-26T12:56:29.537" v="1255"/>
+          <ac:spMkLst>
+            <pc:docMk/>
+            <pc:sldMk cId="3784313263" sldId="262"/>
+            <ac:spMk id="3" creationId="{5AE938A1-E3CB-483D-B0D9-ABA22EE1A7AD}"/>
+          </ac:spMkLst>
+        </pc:spChg>
+        <pc:spChg chg="add mod">
+          <ac:chgData name="Calatayud Trescoli, Carles" userId="112b7921-b0d3-45b1-9c58-8e0889f16e85" providerId="ADAL" clId="{E183D40F-2FAB-4EBB-87AC-D7C1AB9CDFCF}" dt="2022-07-26T12:58:17.168" v="1276" actId="208"/>
+          <ac:spMkLst>
+            <pc:docMk/>
+            <pc:sldMk cId="3784313263" sldId="262"/>
+            <ac:spMk id="5" creationId="{C9EF1006-A961-464B-B5D6-8EC33B61C4C8}"/>
+          </ac:spMkLst>
+        </pc:spChg>
+        <pc:spChg chg="add del">
+          <ac:chgData name="Calatayud Trescoli, Carles" userId="112b7921-b0d3-45b1-9c58-8e0889f16e85" providerId="ADAL" clId="{E183D40F-2FAB-4EBB-87AC-D7C1AB9CDFCF}" dt="2022-07-26T12:56:40.509" v="1258" actId="26606"/>
+          <ac:spMkLst>
+            <pc:docMk/>
+            <pc:sldMk cId="3784313263" sldId="262"/>
+            <ac:spMk id="9" creationId="{46C2E80F-49A6-4372-B103-219D417A55ED}"/>
+          </ac:spMkLst>
+        </pc:spChg>
+        <pc:spChg chg="add del">
+          <ac:chgData name="Calatayud Trescoli, Carles" userId="112b7921-b0d3-45b1-9c58-8e0889f16e85" providerId="ADAL" clId="{E183D40F-2FAB-4EBB-87AC-D7C1AB9CDFCF}" dt="2022-07-26T12:56:40.902" v="1261" actId="26606"/>
+          <ac:spMkLst>
+            <pc:docMk/>
+            <pc:sldMk cId="3784313263" sldId="262"/>
+            <ac:spMk id="11" creationId="{F7117410-A2A4-4085-9ADC-46744551DBDE}"/>
+          </ac:spMkLst>
+        </pc:spChg>
+        <pc:spChg chg="add del">
+          <ac:chgData name="Calatayud Trescoli, Carles" userId="112b7921-b0d3-45b1-9c58-8e0889f16e85" providerId="ADAL" clId="{E183D40F-2FAB-4EBB-87AC-D7C1AB9CDFCF}" dt="2022-07-26T12:56:40.902" v="1261" actId="26606"/>
+          <ac:spMkLst>
+            <pc:docMk/>
+            <pc:sldMk cId="3784313263" sldId="262"/>
+            <ac:spMk id="12" creationId="{7301F447-EEF7-48F5-AF73-7566EE7F64AD}"/>
+          </ac:spMkLst>
+        </pc:spChg>
+        <pc:spChg chg="add del">
+          <ac:chgData name="Calatayud Trescoli, Carles" userId="112b7921-b0d3-45b1-9c58-8e0889f16e85" providerId="ADAL" clId="{E183D40F-2FAB-4EBB-87AC-D7C1AB9CDFCF}" dt="2022-07-26T12:56:40.902" v="1261" actId="26606"/>
+          <ac:spMkLst>
+            <pc:docMk/>
+            <pc:sldMk cId="3784313263" sldId="262"/>
+            <ac:spMk id="13" creationId="{99F74EB5-E547-4FB4-95F5-BCC788F3C4A0}"/>
+          </ac:spMkLst>
+        </pc:spChg>
+        <pc:spChg chg="add mod">
+          <ac:chgData name="Calatayud Trescoli, Carles" userId="112b7921-b0d3-45b1-9c58-8e0889f16e85" providerId="ADAL" clId="{E183D40F-2FAB-4EBB-87AC-D7C1AB9CDFCF}" dt="2022-07-26T12:58:29.847" v="1279" actId="14100"/>
+          <ac:spMkLst>
+            <pc:docMk/>
+            <pc:sldMk cId="3784313263" sldId="262"/>
+            <ac:spMk id="14" creationId="{50313662-8E56-4B74-9ED2-BB31931DEE42}"/>
+          </ac:spMkLst>
+        </pc:spChg>
+        <pc:spChg chg="add del">
+          <ac:chgData name="Calatayud Trescoli, Carles" userId="112b7921-b0d3-45b1-9c58-8e0889f16e85" providerId="ADAL" clId="{E183D40F-2FAB-4EBB-87AC-D7C1AB9CDFCF}" dt="2022-07-26T12:56:47.277" v="1264" actId="26606"/>
+          <ac:spMkLst>
+            <pc:docMk/>
+            <pc:sldMk cId="3784313263" sldId="262"/>
+            <ac:spMk id="15" creationId="{2E442304-DDBD-4F7B-8017-36BCC863FB40}"/>
+          </ac:spMkLst>
+        </pc:spChg>
+        <pc:spChg chg="add del">
+          <ac:chgData name="Calatayud Trescoli, Carles" userId="112b7921-b0d3-45b1-9c58-8e0889f16e85" providerId="ADAL" clId="{E183D40F-2FAB-4EBB-87AC-D7C1AB9CDFCF}" dt="2022-07-26T12:56:47.277" v="1264" actId="26606"/>
+          <ac:spMkLst>
+            <pc:docMk/>
+            <pc:sldMk cId="3784313263" sldId="262"/>
+            <ac:spMk id="16" creationId="{5E107275-3853-46FD-A241-DE4355A42675}"/>
+          </ac:spMkLst>
+        </pc:spChg>
+        <pc:spChg chg="add mod">
+          <ac:chgData name="Calatayud Trescoli, Carles" userId="112b7921-b0d3-45b1-9c58-8e0889f16e85" providerId="ADAL" clId="{E183D40F-2FAB-4EBB-87AC-D7C1AB9CDFCF}" dt="2022-07-26T12:58:43.617" v="1284" actId="14100"/>
+          <ac:spMkLst>
+            <pc:docMk/>
+            <pc:sldMk cId="3784313263" sldId="262"/>
+            <ac:spMk id="17" creationId="{47F44F11-920A-4109-AC03-5C200761E834}"/>
+          </ac:spMkLst>
+        </pc:spChg>
+        <pc:spChg chg="add">
+          <ac:chgData name="Calatayud Trescoli, Carles" userId="112b7921-b0d3-45b1-9c58-8e0889f16e85" providerId="ADAL" clId="{E183D40F-2FAB-4EBB-87AC-D7C1AB9CDFCF}" dt="2022-07-26T12:56:47.277" v="1264" actId="26606"/>
+          <ac:spMkLst>
+            <pc:docMk/>
+            <pc:sldMk cId="3784313263" sldId="262"/>
+            <ac:spMk id="21" creationId="{2E442304-DDBD-4F7B-8017-36BCC863FB40}"/>
+          </ac:spMkLst>
+        </pc:spChg>
+        <pc:spChg chg="add">
+          <ac:chgData name="Calatayud Trescoli, Carles" userId="112b7921-b0d3-45b1-9c58-8e0889f16e85" providerId="ADAL" clId="{E183D40F-2FAB-4EBB-87AC-D7C1AB9CDFCF}" dt="2022-07-26T12:56:47.277" v="1264" actId="26606"/>
+          <ac:spMkLst>
+            <pc:docMk/>
+            <pc:sldMk cId="3784313263" sldId="262"/>
+            <ac:spMk id="23" creationId="{5E107275-3853-46FD-A241-DE4355A42675}"/>
+          </ac:spMkLst>
+        </pc:spChg>
+        <pc:graphicFrameChg chg="add mod">
+          <ac:chgData name="Calatayud Trescoli, Carles" userId="112b7921-b0d3-45b1-9c58-8e0889f16e85" providerId="ADAL" clId="{E183D40F-2FAB-4EBB-87AC-D7C1AB9CDFCF}" dt="2022-07-26T12:58:33.365" v="1281"/>
+          <ac:graphicFrameMkLst>
+            <pc:docMk/>
+            <pc:sldMk cId="3784313263" sldId="262"/>
+            <ac:graphicFrameMk id="4" creationId="{1E9C84D1-CA63-4BB2-93B5-E4DFD12508EE}"/>
+          </ac:graphicFrameMkLst>
+        </pc:graphicFrameChg>
+      </pc:sldChg>
+    </pc:docChg>
+  </pc:docChgLst>
+</pc:chgInfo>
+</file>
+
+<file path=ppt/charts/chart1.xml><?xml version="1.0" encoding="utf-8"?>
+<c:chartSpace xmlns:c="http://schemas.openxmlformats.org/drawingml/2006/chart" xmlns:a="http://schemas.openxmlformats.org/drawingml/2006/main" xmlns:r="http://schemas.openxmlformats.org/officeDocument/2006/relationships" xmlns:c16r2="http://schemas.microsoft.com/office/drawing/2015/06/chart">
+  <c:date1904 val="0"/>
+  <c:lang val="en-US"/>
+  <c:roundedCorners val="0"/>
+  <mc:AlternateContent xmlns:mc="http://schemas.openxmlformats.org/markup-compatibility/2006">
+    <mc:Choice xmlns:c14="http://schemas.microsoft.com/office/drawing/2007/8/2/chart" Requires="c14">
+      <c14:style val="102"/>
+    </mc:Choice>
+    <mc:Fallback>
+      <c:style val="2"/>
+    </mc:Fallback>
+  </mc:AlternateContent>
+  <c:chart>
+    <c:autoTitleDeleted val="0"/>
+    <c:plotArea>
+      <c:layout/>
+      <c:scatterChart>
+        <c:scatterStyle val="lineMarker"/>
+        <c:varyColors val="0"/>
+        <c:ser>
+          <c:idx val="0"/>
+          <c:order val="0"/>
+          <c:tx>
+            <c:strRef>
+              <c:f>Sheet1!$B$1</c:f>
+              <c:strCache>
+                <c:ptCount val="1"/>
+                <c:pt idx="0">
+                  <c:v>X2</c:v>
+                </c:pt>
+              </c:strCache>
+            </c:strRef>
+          </c:tx>
+          <c:spPr>
+            <a:ln w="25400" cap="rnd">
+              <a:noFill/>
+              <a:round/>
+            </a:ln>
+            <a:effectLst>
+              <a:outerShdw dist="25400" dir="2700000" algn="tl" rotWithShape="0">
+                <a:schemeClr val="accent1"/>
+              </a:outerShdw>
+            </a:effectLst>
+          </c:spPr>
+          <c:marker>
+            <c:symbol val="circle"/>
+            <c:size val="6"/>
+            <c:spPr>
+              <a:solidFill>
+                <a:schemeClr val="accent1"/>
+              </a:solidFill>
+              <a:ln w="22225">
+                <a:solidFill>
+                  <a:schemeClr val="lt1"/>
+                </a:solidFill>
+                <a:round/>
+              </a:ln>
+              <a:effectLst/>
+            </c:spPr>
+          </c:marker>
+          <c:xVal>
+            <c:numRef>
+              <c:f>Sheet1!$A$2:$A$67</c:f>
+              <c:numCache>
+                <c:formatCode>General</c:formatCode>
+                <c:ptCount val="66"/>
+                <c:pt idx="0">
+                  <c:v>2</c:v>
+                </c:pt>
+                <c:pt idx="1">
+                  <c:v>3.8</c:v>
+                </c:pt>
+                <c:pt idx="2">
+                  <c:v>2.1</c:v>
+                </c:pt>
+                <c:pt idx="3">
+                  <c:v>4.0999999999999996</c:v>
+                </c:pt>
+                <c:pt idx="4">
+                  <c:v>3.5</c:v>
+                </c:pt>
+                <c:pt idx="5">
+                  <c:v>5.0999999999999996</c:v>
+                </c:pt>
+                <c:pt idx="6">
+                  <c:v>3.4</c:v>
+                </c:pt>
+                <c:pt idx="7">
+                  <c:v>2.7</c:v>
+                </c:pt>
+                <c:pt idx="8">
+                  <c:v>6.9</c:v>
+                </c:pt>
+                <c:pt idx="9">
+                  <c:v>3</c:v>
+                </c:pt>
+                <c:pt idx="10">
+                  <c:v>2.2000000000000002</c:v>
+                </c:pt>
+                <c:pt idx="11">
+                  <c:v>5.0999999999999996</c:v>
+                </c:pt>
+                <c:pt idx="12">
+                  <c:v>6.7</c:v>
+                </c:pt>
+                <c:pt idx="13">
+                  <c:v>2.2999999999999998</c:v>
+                </c:pt>
+                <c:pt idx="14">
+                  <c:v>3.9</c:v>
+                </c:pt>
+                <c:pt idx="15">
+                  <c:v>2.7</c:v>
+                </c:pt>
+                <c:pt idx="16">
+                  <c:v>6.9</c:v>
+                </c:pt>
+                <c:pt idx="17">
+                  <c:v>2.4</c:v>
+                </c:pt>
+                <c:pt idx="18">
+                  <c:v>3</c:v>
+                </c:pt>
+                <c:pt idx="19">
+                  <c:v>5.9</c:v>
+                </c:pt>
+                <c:pt idx="20">
+                  <c:v>4.2</c:v>
+                </c:pt>
+                <c:pt idx="21">
+                  <c:v>3.4</c:v>
+                </c:pt>
+                <c:pt idx="22">
+                  <c:v>4.5</c:v>
+                </c:pt>
+                <c:pt idx="23">
+                  <c:v>2.6</c:v>
+                </c:pt>
+                <c:pt idx="24">
+                  <c:v>3.9</c:v>
+                </c:pt>
+                <c:pt idx="25">
+                  <c:v>6.2</c:v>
+                </c:pt>
+                <c:pt idx="26">
+                  <c:v>2.7</c:v>
+                </c:pt>
+                <c:pt idx="27">
+                  <c:v>5.3</c:v>
+                </c:pt>
+                <c:pt idx="28">
+                  <c:v>3</c:v>
+                </c:pt>
+                <c:pt idx="29">
+                  <c:v>5.8</c:v>
+                </c:pt>
+                <c:pt idx="30">
+                  <c:v>2.5</c:v>
+                </c:pt>
+                <c:pt idx="31">
+                  <c:v>7</c:v>
+                </c:pt>
+                <c:pt idx="32">
+                  <c:v>4.5</c:v>
+                </c:pt>
+                <c:pt idx="33">
+                  <c:v>4.0999999999999996</c:v>
+                </c:pt>
+                <c:pt idx="34">
+                  <c:v>5.5</c:v>
+                </c:pt>
+                <c:pt idx="35">
+                  <c:v>6.5</c:v>
+                </c:pt>
+                <c:pt idx="36">
+                  <c:v>5.4</c:v>
+                </c:pt>
+                <c:pt idx="37">
+                  <c:v>5.0999999999999996</c:v>
+                </c:pt>
+                <c:pt idx="38">
+                  <c:v>5.5</c:v>
+                </c:pt>
+                <c:pt idx="39">
+                  <c:v>3.1</c:v>
+                </c:pt>
+                <c:pt idx="40">
+                  <c:v>6</c:v>
+                </c:pt>
+                <c:pt idx="41">
+                  <c:v>6.2</c:v>
+                </c:pt>
+                <c:pt idx="42">
+                  <c:v>3</c:v>
+                </c:pt>
+                <c:pt idx="43">
+                  <c:v>2.8</c:v>
+                </c:pt>
+                <c:pt idx="44">
+                  <c:v>3</c:v>
+                </c:pt>
+                <c:pt idx="45">
+                  <c:v>7</c:v>
+                </c:pt>
+                <c:pt idx="46">
+                  <c:v>4.3</c:v>
+                </c:pt>
+                <c:pt idx="47">
+                  <c:v>2.9</c:v>
+                </c:pt>
+                <c:pt idx="48">
+                  <c:v>3.2</c:v>
+                </c:pt>
+                <c:pt idx="49">
+                  <c:v>2</c:v>
+                </c:pt>
+                <c:pt idx="50">
+                  <c:v>6.6</c:v>
+                </c:pt>
+                <c:pt idx="51">
+                  <c:v>5.5</c:v>
+                </c:pt>
+                <c:pt idx="52">
+                  <c:v>6.3</c:v>
+                </c:pt>
+                <c:pt idx="53">
+                  <c:v>6.9</c:v>
+                </c:pt>
+                <c:pt idx="54">
+                  <c:v>4.5999999999999996</c:v>
+                </c:pt>
+                <c:pt idx="55">
+                  <c:v>3.9</c:v>
+                </c:pt>
+                <c:pt idx="56">
+                  <c:v>3</c:v>
+                </c:pt>
+                <c:pt idx="57">
+                  <c:v>6.5</c:v>
+                </c:pt>
+                <c:pt idx="58">
+                  <c:v>2.8</c:v>
+                </c:pt>
+                <c:pt idx="59">
+                  <c:v>2.9</c:v>
+                </c:pt>
+                <c:pt idx="60">
+                  <c:v>3.3</c:v>
+                </c:pt>
+                <c:pt idx="61">
+                  <c:v>2</c:v>
+                </c:pt>
+                <c:pt idx="62">
+                  <c:v>6</c:v>
+                </c:pt>
+                <c:pt idx="63">
+                  <c:v>3.2</c:v>
+                </c:pt>
+                <c:pt idx="64">
+                  <c:v>6.5</c:v>
+                </c:pt>
+                <c:pt idx="65">
+                  <c:v>6</c:v>
+                </c:pt>
+              </c:numCache>
+            </c:numRef>
+          </c:xVal>
+          <c:yVal>
+            <c:numRef>
+              <c:f>Sheet1!$B$2:$B$67</c:f>
+              <c:numCache>
+                <c:formatCode>General</c:formatCode>
+                <c:ptCount val="66"/>
+                <c:pt idx="0">
+                  <c:v>7.6492804288855893</c:v>
+                </c:pt>
+                <c:pt idx="1">
+                  <c:v>2.7455679661014631</c:v>
+                </c:pt>
+                <c:pt idx="2">
+                  <c:v>7.3899065584316386</c:v>
+                </c:pt>
+                <c:pt idx="3">
+                  <c:v>5.3124244994781549</c:v>
+                </c:pt>
+                <c:pt idx="4">
+                  <c:v>4.6214358714429693</c:v>
+                </c:pt>
+                <c:pt idx="5">
+                  <c:v>4.1856701246161485</c:v>
+                </c:pt>
+                <c:pt idx="6">
+                  <c:v>3.2485014423607468</c:v>
+                </c:pt>
+                <c:pt idx="7">
+                  <c:v>3.5087972983824396</c:v>
+                </c:pt>
+                <c:pt idx="8">
+                  <c:v>2.9383835306689416</c:v>
+                </c:pt>
+                <c:pt idx="9">
+                  <c:v>4.6289918286086476</c:v>
+                </c:pt>
+                <c:pt idx="10">
+                  <c:v>5.7900779467784353</c:v>
+                </c:pt>
+                <c:pt idx="11">
+                  <c:v>4.3154997424626176</c:v>
+                </c:pt>
+                <c:pt idx="12">
+                  <c:v>2.4483904530347758</c:v>
+                </c:pt>
+                <c:pt idx="13">
+                  <c:v>6.9541387026205523</c:v>
+                </c:pt>
+                <c:pt idx="14">
+                  <c:v>5.2124577850980236</c:v>
+                </c:pt>
+                <c:pt idx="15">
+                  <c:v>7.1803964825920676</c:v>
+                </c:pt>
+                <c:pt idx="16">
+                  <c:v>1.2528444644819476</c:v>
+                </c:pt>
+                <c:pt idx="17">
+                  <c:v>5.185601162065077</c:v>
+                </c:pt>
+                <c:pt idx="18">
+                  <c:v>3.2695955106671084</c:v>
+                </c:pt>
+                <c:pt idx="19">
+                  <c:v>1.1208944307075392</c:v>
+                </c:pt>
+                <c:pt idx="20">
+                  <c:v>4.9982191251383954</c:v>
+                </c:pt>
+                <c:pt idx="21">
+                  <c:v>5.5071889700976886</c:v>
+                </c:pt>
+                <c:pt idx="22">
+                  <c:v>2.4084476221584294</c:v>
+                </c:pt>
+                <c:pt idx="23">
+                  <c:v>6.80008826491951</c:v>
+                </c:pt>
+                <c:pt idx="24">
+                  <c:v>5.2094285289137359</c:v>
+                </c:pt>
+                <c:pt idx="25">
+                  <c:v>0.61060582724249013</c:v>
+                </c:pt>
+                <c:pt idx="26">
+                  <c:v>5.9548575654716727</c:v>
+                </c:pt>
+                <c:pt idx="27">
+                  <c:v>2.3908776881461646</c:v>
+                </c:pt>
+                <c:pt idx="28">
+                  <c:v>5.7396766484382411</c:v>
+                </c:pt>
+                <c:pt idx="29">
+                  <c:v>3.4412306677346072</c:v>
+                </c:pt>
+                <c:pt idx="30">
+                  <c:v>5.2063568070812076</c:v>
+                </c:pt>
+                <c:pt idx="31">
+                  <c:v>2.3494665935974277</c:v>
+                </c:pt>
+                <c:pt idx="32">
+                  <c:v>2.6507305694868348</c:v>
+                </c:pt>
+                <c:pt idx="33">
+                  <c:v>4.9548581647599104</c:v>
+                </c:pt>
+                <c:pt idx="34">
+                  <c:v>3.5840366309367475</c:v>
+                </c:pt>
+                <c:pt idx="35">
+                  <c:v>1.7289059780467022</c:v>
+                </c:pt>
+                <c:pt idx="36">
+                  <c:v>1.4251366005529991</c:v>
+                </c:pt>
+                <c:pt idx="37">
+                  <c:v>4.6842810880371264</c:v>
+                </c:pt>
+                <c:pt idx="38">
+                  <c:v>4.0514482032547026</c:v>
+                </c:pt>
+                <c:pt idx="39">
+                  <c:v>4.0393079470979085</c:v>
+                </c:pt>
+                <c:pt idx="40">
+                  <c:v>3.5471609196976486</c:v>
+                </c:pt>
+                <c:pt idx="41">
+                  <c:v>3.1031080248130882</c:v>
+                </c:pt>
+                <c:pt idx="42">
+                  <c:v>6.3460436873492387</c:v>
+                </c:pt>
+                <c:pt idx="43">
+                  <c:v>5.6964825881163126</c:v>
+                </c:pt>
+                <c:pt idx="44">
+                  <c:v>6.3384688209314684</c:v>
+                </c:pt>
+                <c:pt idx="45">
+                  <c:v>2.8344491269690963</c:v>
+                </c:pt>
+                <c:pt idx="46">
+                  <c:v>4.243487489936399</c:v>
+                </c:pt>
+                <c:pt idx="47">
+                  <c:v>3.1879494513975164</c:v>
+                </c:pt>
+                <c:pt idx="48">
+                  <c:v>5.3522051491874674</c:v>
+                </c:pt>
+                <c:pt idx="49">
+                  <c:v>6.6981066325162999</c:v>
+                </c:pt>
+                <c:pt idx="50">
+                  <c:v>0.47615191418726877</c:v>
+                </c:pt>
+                <c:pt idx="51">
+                  <c:v>0.72113282135707824</c:v>
+                </c:pt>
+                <c:pt idx="52">
+                  <c:v>2.7211776595755142</c:v>
+                </c:pt>
+                <c:pt idx="53">
+                  <c:v>0.54425966289372729</c:v>
+                </c:pt>
+                <c:pt idx="54">
+                  <c:v>2.7553529575043498</c:v>
+                </c:pt>
+                <c:pt idx="55">
+                  <c:v>5.8278993874428036</c:v>
+                </c:pt>
+                <c:pt idx="56">
+                  <c:v>6.7400709042451243</c:v>
+                </c:pt>
+                <c:pt idx="57">
+                  <c:v>1.9883502219842675</c:v>
+                </c:pt>
+                <c:pt idx="58">
+                  <c:v>4.3447755019523839</c:v>
+                </c:pt>
+                <c:pt idx="59">
+                  <c:v>6.3922185846568853</c:v>
+                </c:pt>
+                <c:pt idx="60">
+                  <c:v>5.8741753860241417</c:v>
+                </c:pt>
+                <c:pt idx="61">
+                  <c:v>5.3880285225464668</c:v>
+                </c:pt>
+                <c:pt idx="62">
+                  <c:v>3.840815906987423</c:v>
+                </c:pt>
+                <c:pt idx="63">
+                  <c:v>2.3933668730417406</c:v>
+                </c:pt>
+                <c:pt idx="64">
+                  <c:v>0.85104011147892544</c:v>
+                </c:pt>
+                <c:pt idx="65">
+                  <c:v>3.5673978126523638</c:v>
+                </c:pt>
+              </c:numCache>
+            </c:numRef>
+          </c:yVal>
+          <c:smooth val="0"/>
+          <c:extLst>
+            <c:ext xmlns:c16="http://schemas.microsoft.com/office/drawing/2014/chart" uri="{C3380CC4-5D6E-409C-BE32-E72D297353CC}">
+              <c16:uniqueId val="{00000000-EAE6-4EAB-9C2D-C5DBB310EE47}"/>
+            </c:ext>
+          </c:extLst>
+        </c:ser>
+        <c:ser>
+          <c:idx val="1"/>
+          <c:order val="1"/>
+          <c:tx>
+            <c:strRef>
+              <c:f>Sheet1!$E$1</c:f>
+              <c:strCache>
+                <c:ptCount val="1"/>
+                <c:pt idx="0">
+                  <c:v>X22</c:v>
+                </c:pt>
+              </c:strCache>
+            </c:strRef>
+          </c:tx>
+          <c:spPr>
+            <a:ln w="25400" cap="rnd">
+              <a:noFill/>
+              <a:round/>
+            </a:ln>
+            <a:effectLst>
+              <a:outerShdw dist="25400" dir="2700000" algn="tl" rotWithShape="0">
+                <a:schemeClr val="accent2"/>
+              </a:outerShdw>
+            </a:effectLst>
+          </c:spPr>
+          <c:marker>
+            <c:symbol val="circle"/>
+            <c:size val="6"/>
+            <c:spPr>
+              <a:solidFill>
+                <a:schemeClr val="accent2"/>
+              </a:solidFill>
+              <a:ln w="22225">
+                <a:solidFill>
+                  <a:schemeClr val="lt1"/>
+                </a:solidFill>
+                <a:round/>
+              </a:ln>
+              <a:effectLst/>
+            </c:spPr>
+          </c:marker>
+          <c:xVal>
+            <c:numRef>
+              <c:f>Sheet1!$D$2:$D$67</c:f>
+              <c:numCache>
+                <c:formatCode>General</c:formatCode>
+                <c:ptCount val="66"/>
+                <c:pt idx="0">
+                  <c:v>6.8</c:v>
+                </c:pt>
+                <c:pt idx="1">
+                  <c:v>2</c:v>
+                </c:pt>
+                <c:pt idx="2">
+                  <c:v>2.1</c:v>
+                </c:pt>
+                <c:pt idx="3">
+                  <c:v>4.9000000000000004</c:v>
+                </c:pt>
+                <c:pt idx="4">
+                  <c:v>5.0999999999999996</c:v>
+                </c:pt>
+                <c:pt idx="5">
+                  <c:v>6</c:v>
+                </c:pt>
+                <c:pt idx="6">
+                  <c:v>4.5</c:v>
+                </c:pt>
+                <c:pt idx="7">
+                  <c:v>2.6</c:v>
+                </c:pt>
+                <c:pt idx="8">
+                  <c:v>4.5999999999999996</c:v>
+                </c:pt>
+                <c:pt idx="9">
+                  <c:v>2.4</c:v>
+                </c:pt>
+                <c:pt idx="10">
+                  <c:v>2.1</c:v>
+                </c:pt>
+                <c:pt idx="11">
+                  <c:v>4.8</c:v>
+                </c:pt>
+                <c:pt idx="12">
+                  <c:v>6</c:v>
+                </c:pt>
+                <c:pt idx="13">
+                  <c:v>6.9</c:v>
+                </c:pt>
+                <c:pt idx="14">
+                  <c:v>2.1</c:v>
+                </c:pt>
+                <c:pt idx="15">
+                  <c:v>6.2</c:v>
+                </c:pt>
+                <c:pt idx="16">
+                  <c:v>5.7</c:v>
+                </c:pt>
+                <c:pt idx="17">
+                  <c:v>3.8</c:v>
+                </c:pt>
+                <c:pt idx="18">
+                  <c:v>3.6</c:v>
+                </c:pt>
+                <c:pt idx="19">
+                  <c:v>2.6</c:v>
+                </c:pt>
+                <c:pt idx="20">
+                  <c:v>6.8</c:v>
+                </c:pt>
+                <c:pt idx="21">
+                  <c:v>4.5999999999999996</c:v>
+                </c:pt>
+                <c:pt idx="22">
+                  <c:v>4.3</c:v>
+                </c:pt>
+                <c:pt idx="23">
+                  <c:v>2</c:v>
+                </c:pt>
+                <c:pt idx="24">
+                  <c:v>2.4</c:v>
+                </c:pt>
+                <c:pt idx="25">
+                  <c:v>3.6</c:v>
+                </c:pt>
+                <c:pt idx="26">
+                  <c:v>6.3</c:v>
+                </c:pt>
+                <c:pt idx="27">
+                  <c:v>6.7</c:v>
+                </c:pt>
+                <c:pt idx="28">
+                  <c:v>5.3</c:v>
+                </c:pt>
+                <c:pt idx="29">
+                  <c:v>3.2</c:v>
+                </c:pt>
+                <c:pt idx="30">
+                  <c:v>4.7</c:v>
+                </c:pt>
+                <c:pt idx="31">
+                  <c:v>4.9000000000000004</c:v>
+                </c:pt>
+                <c:pt idx="32">
+                  <c:v>6.2</c:v>
+                </c:pt>
+                <c:pt idx="33">
+                  <c:v>2.6</c:v>
+                </c:pt>
+                <c:pt idx="34">
+                  <c:v>3.8</c:v>
+                </c:pt>
+                <c:pt idx="35">
+                  <c:v>2.2999999999999998</c:v>
+                </c:pt>
+                <c:pt idx="36">
+                  <c:v>3.1</c:v>
+                </c:pt>
+                <c:pt idx="37">
+                  <c:v>2.6</c:v>
+                </c:pt>
+                <c:pt idx="38">
+                  <c:v>3.6</c:v>
+                </c:pt>
+                <c:pt idx="39">
+                  <c:v>4.0999999999999996</c:v>
+                </c:pt>
+              </c:numCache>
+            </c:numRef>
+          </c:xVal>
+          <c:yVal>
+            <c:numRef>
+              <c:f>Sheet1!$E$2:$E$67</c:f>
+              <c:numCache>
+                <c:formatCode>General</c:formatCode>
+                <c:ptCount val="66"/>
+                <c:pt idx="0">
+                  <c:v>7.6191464726956362</c:v>
+                </c:pt>
+                <c:pt idx="1">
+                  <c:v>8.7562738912710039</c:v>
+                </c:pt>
+                <c:pt idx="2">
+                  <c:v>8.6066269167644904</c:v>
+                </c:pt>
+                <c:pt idx="3">
+                  <c:v>7.5586821155044444</c:v>
+                </c:pt>
+                <c:pt idx="4">
+                  <c:v>6.3721661560622183</c:v>
+                </c:pt>
+                <c:pt idx="5">
+                  <c:v>5.845737429586281</c:v>
+                </c:pt>
+                <c:pt idx="6">
+                  <c:v>6.9749503825853472</c:v>
+                </c:pt>
+                <c:pt idx="7">
+                  <c:v>10.487608789010645</c:v>
+                </c:pt>
+                <c:pt idx="8">
+                  <c:v>9.2477024033371169</c:v>
+                </c:pt>
+                <c:pt idx="9">
+                  <c:v>12.050985434595431</c:v>
+                </c:pt>
+                <c:pt idx="10">
+                  <c:v>9.2112986560742165</c:v>
+                </c:pt>
+                <c:pt idx="11">
+                  <c:v>5.7681604381356699</c:v>
+                </c:pt>
+                <c:pt idx="12">
+                  <c:v>6.6090788917855789</c:v>
+                </c:pt>
+                <c:pt idx="13">
+                  <c:v>6.3357544635455696</c:v>
+                </c:pt>
+                <c:pt idx="14">
+                  <c:v>8.4073584240452881</c:v>
+                </c:pt>
+                <c:pt idx="15">
+                  <c:v>4.8318321112781142</c:v>
+                </c:pt>
+                <c:pt idx="16">
+                  <c:v>6.5954667622801804</c:v>
+                </c:pt>
+                <c:pt idx="17">
+                  <c:v>8.3789673462076379</c:v>
+                </c:pt>
+                <c:pt idx="18">
+                  <c:v>7.0822880565540709</c:v>
+                </c:pt>
+                <c:pt idx="19">
+                  <c:v>8.0903418199651416</c:v>
+                </c:pt>
+                <c:pt idx="20">
+                  <c:v>5.0246457259952937</c:v>
+                </c:pt>
+                <c:pt idx="21">
+                  <c:v>6.2773821869923561</c:v>
+                </c:pt>
+                <c:pt idx="22">
+                  <c:v>8.5992887717827848</c:v>
+                </c:pt>
+                <c:pt idx="23">
+                  <c:v>9.0830751813933972</c:v>
+                </c:pt>
+                <c:pt idx="24">
+                  <c:v>11.762871139825013</c:v>
+                </c:pt>
+                <c:pt idx="25">
+                  <c:v>8.7627515275140464</c:v>
+                </c:pt>
+                <c:pt idx="26">
+                  <c:v>4.4300114094786274</c:v>
+                </c:pt>
+                <c:pt idx="27">
+                  <c:v>5.8192034269428872</c:v>
+                </c:pt>
+                <c:pt idx="28">
+                  <c:v>9.1318689309880181</c:v>
+                </c:pt>
+                <c:pt idx="29">
+                  <c:v>7.4501570330731344</c:v>
+                </c:pt>
+                <c:pt idx="30">
+                  <c:v>6.0060048743560648</c:v>
+                </c:pt>
+                <c:pt idx="31">
+                  <c:v>6.4197242800930896</c:v>
+                </c:pt>
+                <c:pt idx="32">
+                  <c:v>6.2604253474708091</c:v>
+                </c:pt>
+                <c:pt idx="33">
+                  <c:v>9.4388458995566769</c:v>
+                </c:pt>
+                <c:pt idx="34">
+                  <c:v>6.9626842804874762</c:v>
+                </c:pt>
+                <c:pt idx="35">
+                  <c:v>10.282747355612717</c:v>
+                </c:pt>
+                <c:pt idx="36">
+                  <c:v>8.3752581600906133</c:v>
+                </c:pt>
+                <c:pt idx="37">
+                  <c:v>9.8634744235661458</c:v>
+                </c:pt>
+                <c:pt idx="38">
+                  <c:v>11.537540222544859</c:v>
+                </c:pt>
+                <c:pt idx="39">
+                  <c:v>7.0794495774349411</c:v>
+                </c:pt>
+              </c:numCache>
+            </c:numRef>
+          </c:yVal>
+          <c:smooth val="0"/>
+          <c:extLst>
+            <c:ext xmlns:c16="http://schemas.microsoft.com/office/drawing/2014/chart" uri="{C3380CC4-5D6E-409C-BE32-E72D297353CC}">
+              <c16:uniqueId val="{00000001-EAE6-4EAB-9C2D-C5DBB310EE47}"/>
+            </c:ext>
+          </c:extLst>
+        </c:ser>
+        <c:ser>
+          <c:idx val="2"/>
+          <c:order val="2"/>
+          <c:tx>
+            <c:strRef>
+              <c:f>Sheet1!$G$1</c:f>
+              <c:strCache>
+                <c:ptCount val="1"/>
+                <c:pt idx="0">
+                  <c:v>x111</c:v>
+                </c:pt>
+              </c:strCache>
+            </c:strRef>
+          </c:tx>
+          <c:spPr>
+            <a:ln w="25400" cap="rnd">
+              <a:noFill/>
+              <a:round/>
+            </a:ln>
+            <a:effectLst>
+              <a:outerShdw dist="25400" dir="2700000" algn="tl" rotWithShape="0">
+                <a:schemeClr val="accent3"/>
+              </a:outerShdw>
+            </a:effectLst>
+          </c:spPr>
+          <c:marker>
+            <c:symbol val="circle"/>
+            <c:size val="6"/>
+            <c:spPr>
+              <a:solidFill>
+                <a:srgbClr val="92D050"/>
+              </a:solidFill>
+              <a:ln w="41275">
+                <a:solidFill>
+                  <a:schemeClr val="accent6"/>
+                </a:solidFill>
+                <a:round/>
+              </a:ln>
+              <a:effectLst/>
+            </c:spPr>
+          </c:marker>
+          <c:xVal>
+            <c:numRef>
+              <c:f>Sheet1!$G$2</c:f>
+              <c:numCache>
+                <c:formatCode>General</c:formatCode>
+                <c:ptCount val="1"/>
+                <c:pt idx="0">
+                  <c:v>4</c:v>
+                </c:pt>
+              </c:numCache>
+            </c:numRef>
+          </c:xVal>
+          <c:yVal>
+            <c:numRef>
+              <c:f>Sheet1!$H$2</c:f>
+              <c:numCache>
+                <c:formatCode>General</c:formatCode>
+                <c:ptCount val="1"/>
+                <c:pt idx="0">
+                  <c:v>6.5</c:v>
+                </c:pt>
+              </c:numCache>
+            </c:numRef>
+          </c:yVal>
+          <c:smooth val="0"/>
+          <c:extLst>
+            <c:ext xmlns:c16="http://schemas.microsoft.com/office/drawing/2014/chart" uri="{C3380CC4-5D6E-409C-BE32-E72D297353CC}">
+              <c16:uniqueId val="{00000002-EAE6-4EAB-9C2D-C5DBB310EE47}"/>
+            </c:ext>
+          </c:extLst>
+        </c:ser>
+        <c:dLbls>
+          <c:showLegendKey val="0"/>
+          <c:showVal val="0"/>
+          <c:showCatName val="0"/>
+          <c:showSerName val="0"/>
+          <c:showPercent val="0"/>
+          <c:showBubbleSize val="0"/>
+        </c:dLbls>
+        <c:axId val="1951756656"/>
+        <c:axId val="1951753328"/>
+      </c:scatterChart>
+      <c:valAx>
+        <c:axId val="1951756656"/>
+        <c:scaling>
+          <c:orientation val="minMax"/>
+        </c:scaling>
+        <c:delete val="0"/>
+        <c:axPos val="b"/>
+        <c:majorGridlines>
+          <c:spPr>
+            <a:ln w="9525" cap="flat" cmpd="sng" algn="ctr">
+              <a:solidFill>
+                <a:schemeClr val="lt1">
+                  <a:alpha val="25000"/>
+                </a:schemeClr>
+              </a:solidFill>
+              <a:round/>
+            </a:ln>
+            <a:effectLst/>
+          </c:spPr>
+        </c:majorGridlines>
+        <c:numFmt formatCode="General" sourceLinked="1"/>
+        <c:majorTickMark val="none"/>
+        <c:minorTickMark val="none"/>
+        <c:tickLblPos val="nextTo"/>
+        <c:spPr>
+          <a:noFill/>
+          <a:ln w="12700" cap="flat" cmpd="sng" algn="ctr">
+            <a:solidFill>
+              <a:schemeClr val="lt1">
+                <a:alpha val="25000"/>
+              </a:schemeClr>
+            </a:solidFill>
+            <a:round/>
+          </a:ln>
+          <a:effectLst/>
+        </c:spPr>
+        <c:txPr>
+          <a:bodyPr rot="-60000000" spcFirstLastPara="1" vertOverflow="ellipsis" vert="horz" wrap="square" anchor="ctr" anchorCtr="1"/>
+          <a:lstStyle/>
+          <a:p>
+            <a:pPr>
+              <a:defRPr sz="900" b="0" i="0" u="none" strike="noStrike" kern="1200" spc="100" baseline="0">
+                <a:solidFill>
+                  <a:schemeClr val="lt1"/>
+                </a:solidFill>
+                <a:latin typeface="+mn-lt"/>
+                <a:ea typeface="+mn-ea"/>
+                <a:cs typeface="+mn-cs"/>
+              </a:defRPr>
+            </a:pPr>
+            <a:endParaRPr lang="es-ES"/>
+          </a:p>
+        </c:txPr>
+        <c:crossAx val="1951753328"/>
+        <c:crosses val="autoZero"/>
+        <c:crossBetween val="midCat"/>
+      </c:valAx>
+      <c:valAx>
+        <c:axId val="1951753328"/>
+        <c:scaling>
+          <c:orientation val="minMax"/>
+        </c:scaling>
+        <c:delete val="0"/>
+        <c:axPos val="l"/>
+        <c:majorGridlines>
+          <c:spPr>
+            <a:ln w="9525" cap="flat" cmpd="sng" algn="ctr">
+              <a:solidFill>
+                <a:schemeClr val="lt1">
+                  <a:alpha val="25000"/>
+                </a:schemeClr>
+              </a:solidFill>
+              <a:round/>
+            </a:ln>
+            <a:effectLst/>
+          </c:spPr>
+        </c:majorGridlines>
+        <c:numFmt formatCode="General" sourceLinked="1"/>
+        <c:majorTickMark val="none"/>
+        <c:minorTickMark val="none"/>
+        <c:tickLblPos val="nextTo"/>
+        <c:spPr>
+          <a:noFill/>
+          <a:ln>
+            <a:noFill/>
+          </a:ln>
+          <a:effectLst/>
+        </c:spPr>
+        <c:txPr>
+          <a:bodyPr rot="-60000000" spcFirstLastPara="1" vertOverflow="ellipsis" vert="horz" wrap="square" anchor="ctr" anchorCtr="1"/>
+          <a:lstStyle/>
+          <a:p>
+            <a:pPr>
+              <a:defRPr sz="900" b="0" i="0" u="none" strike="noStrike" kern="1200" baseline="0">
+                <a:solidFill>
+                  <a:schemeClr val="lt1"/>
+                </a:solidFill>
+                <a:latin typeface="+mn-lt"/>
+                <a:ea typeface="+mn-ea"/>
+                <a:cs typeface="+mn-cs"/>
+              </a:defRPr>
+            </a:pPr>
+            <a:endParaRPr lang="es-ES"/>
+          </a:p>
+        </c:txPr>
+        <c:crossAx val="1951756656"/>
+        <c:crosses val="autoZero"/>
+        <c:crossBetween val="midCat"/>
+      </c:valAx>
+      <c:spPr>
+        <a:noFill/>
+        <a:ln>
+          <a:noFill/>
+        </a:ln>
+        <a:effectLst/>
+      </c:spPr>
+    </c:plotArea>
+    <c:plotVisOnly val="1"/>
+    <c:dispBlanksAs val="gap"/>
+    <c:extLst>
+      <c:ext xmlns:c16r3="http://schemas.microsoft.com/office/drawing/2017/03/chart" uri="{56B9EC1D-385E-4148-901F-78D8002777C0}">
+        <c16r3:dataDisplayOptions16>
+          <c16r3:dispNaAsBlank val="1"/>
+        </c16r3:dataDisplayOptions16>
+      </c:ext>
+    </c:extLst>
+    <c:showDLblsOverMax val="0"/>
+  </c:chart>
+  <c:spPr>
+    <a:solidFill>
+      <a:schemeClr val="accent1"/>
+    </a:solidFill>
+    <a:ln w="9525" cap="flat" cmpd="sng" algn="ctr">
+      <a:solidFill>
+        <a:schemeClr val="accent1"/>
+      </a:solidFill>
+      <a:round/>
+    </a:ln>
+    <a:effectLst/>
+  </c:spPr>
+  <c:txPr>
+    <a:bodyPr/>
+    <a:lstStyle/>
+    <a:p>
+      <a:pPr>
+        <a:defRPr/>
+      </a:pPr>
+      <a:endParaRPr lang="es-ES"/>
+    </a:p>
+  </c:txPr>
+  <c:externalData r:id="rId3">
+    <c:autoUpdate val="0"/>
+  </c:externalData>
+</c:chartSpace>
+</file>
+
+<file path=ppt/charts/colors1.xml><?xml version="1.0" encoding="utf-8"?>
+<cs:colorStyle xmlns:cs="http://schemas.microsoft.com/office/drawing/2012/chartStyle" xmlns:a="http://schemas.openxmlformats.org/drawingml/2006/main" meth="acrossLinear" id="2">
+  <a:schemeClr val="accent1"/>
+  <a:schemeClr val="accent2"/>
+  <a:schemeClr val="accent3"/>
+  <a:schemeClr val="accent4"/>
+  <a:schemeClr val="accent5"/>
+  <a:schemeClr val="accent6"/>
+</cs:colorStyle>
+</file>
+
+<file path=ppt/charts/style1.xml><?xml version="1.0" encoding="utf-8"?>
+<cs:chartStyle xmlns:cs="http://schemas.microsoft.com/office/drawing/2012/chartStyle" xmlns:a="http://schemas.openxmlformats.org/drawingml/2006/main" id="247">
+  <cs:axisTitle>
+    <cs:lnRef idx="0"/>
+    <cs:fillRef idx="0"/>
+    <cs:effectRef idx="0"/>
+    <cs:fontRef idx="minor">
+      <a:schemeClr val="lt1"/>
+    </cs:fontRef>
+    <cs:defRPr sz="900" b="1" kern="1200"/>
+  </cs:axisTitle>
+  <cs:categoryAxis>
+    <cs:lnRef idx="0">
+      <cs:styleClr val="0"/>
+    </cs:lnRef>
+    <cs:fillRef idx="0"/>
+    <cs:effectRef idx="0"/>
+    <cs:fontRef idx="minor">
+      <a:schemeClr val="lt1"/>
+    </cs:fontRef>
+    <cs:spPr>
+      <a:ln w="12700" cap="flat" cmpd="sng" algn="ctr">
+        <a:solidFill>
+          <a:schemeClr val="lt1">
+            <a:alpha val="25000"/>
+          </a:schemeClr>
+        </a:solidFill>
+        <a:round/>
+      </a:ln>
+    </cs:spPr>
+    <cs:defRPr sz="900" b="0" kern="1200" spc="100" baseline="0"/>
+  </cs:categoryAxis>
+  <cs:chartArea>
+    <cs:lnRef idx="0">
+      <cs:styleClr val="0"/>
+    </cs:lnRef>
+    <cs:fillRef idx="0">
+      <cs:styleClr val="0"/>
+    </cs:fillRef>
+    <cs:effectRef idx="0"/>
+    <cs:fontRef idx="minor">
+      <a:schemeClr val="dk1"/>
+    </cs:fontRef>
+    <cs:spPr>
+      <a:solidFill>
+        <a:schemeClr val="phClr"/>
+      </a:solidFill>
+      <a:ln w="9525" cap="flat" cmpd="sng" algn="ctr">
+        <a:solidFill>
+          <a:schemeClr val="phClr"/>
+        </a:solidFill>
+        <a:round/>
+      </a:ln>
+    </cs:spPr>
+    <cs:defRPr sz="1000" kern="1200"/>
+  </cs:chartArea>
+  <cs:dataLabel>
+    <cs:lnRef idx="0"/>
+    <cs:fillRef idx="0"/>
+    <cs:effectRef idx="0"/>
+    <cs:fontRef idx="minor">
+      <a:schemeClr val="lt1"/>
+    </cs:fontRef>
+    <cs:defRPr sz="900" b="1" kern="1200"/>
+  </cs:dataLabel>
+  <cs:dataLabelCallout>
+    <cs:lnRef idx="0">
+      <cs:styleClr val="auto"/>
+    </cs:lnRef>
+    <cs:fillRef idx="0"/>
+    <cs:effectRef idx="0"/>
+    <cs:fontRef idx="minor">
+      <cs:styleClr val="auto"/>
+    </cs:fontRef>
+    <cs:spPr>
+      <a:solidFill>
+        <a:schemeClr val="lt1"/>
+      </a:solidFill>
+      <a:ln>
+        <a:solidFill>
+          <a:schemeClr val="phClr"/>
+        </a:solidFill>
+      </a:ln>
+    </cs:spPr>
+    <cs:defRPr sz="900" kern="1200"/>
+    <cs:bodyPr rot="0" spcFirstLastPara="1" vertOverflow="clip" horzOverflow="clip" vert="horz" wrap="square" lIns="36576" tIns="18288" rIns="36576" bIns="18288" anchor="ctr" anchorCtr="1">
+      <a:spAutoFit/>
+    </cs:bodyPr>
+  </cs:dataLabelCallout>
+  <cs:dataPoint>
+    <cs:lnRef idx="0"/>
+    <cs:fillRef idx="0">
+      <cs:styleClr val="auto"/>
+    </cs:fillRef>
+    <cs:effectRef idx="0"/>
+    <cs:fontRef idx="minor">
+      <a:schemeClr val="dk1"/>
+    </cs:fontRef>
+    <cs:spPr>
+      <a:pattFill prst="ltUpDiag">
+        <a:fgClr>
+          <a:schemeClr val="phClr"/>
+        </a:fgClr>
+        <a:bgClr>
+          <a:schemeClr val="lt1"/>
+        </a:bgClr>
+      </a:pattFill>
+    </cs:spPr>
+  </cs:dataPoint>
+  <cs:dataPoint3D>
+    <cs:lnRef idx="0"/>
+    <cs:fillRef idx="0">
+      <cs:styleClr val="auto"/>
+    </cs:fillRef>
+    <cs:effectRef idx="0"/>
+    <cs:fontRef idx="minor">
+      <a:schemeClr val="dk1"/>
+    </cs:fontRef>
+    <cs:spPr>
+      <a:pattFill prst="ltUpDiag">
+        <a:fgClr>
+          <a:schemeClr val="phClr"/>
+        </a:fgClr>
+        <a:bgClr>
+          <a:schemeClr val="lt1"/>
+        </a:bgClr>
+      </a:pattFill>
+    </cs:spPr>
+  </cs:dataPoint3D>
+  <cs:dataPointLine>
+    <cs:lnRef idx="0">
+      <cs:styleClr val="auto"/>
+    </cs:lnRef>
+    <cs:fillRef idx="0"/>
+    <cs:effectRef idx="0">
+      <cs:styleClr val="auto"/>
+    </cs:effectRef>
+    <cs:fontRef idx="minor">
+      <a:schemeClr val="dk1"/>
+    </cs:fontRef>
+    <cs:spPr>
+      <a:ln w="28575" cap="rnd">
+        <a:solidFill>
+          <a:schemeClr val="lt1">
+            <a:alpha val="50000"/>
+          </a:schemeClr>
+        </a:solidFill>
+        <a:round/>
+      </a:ln>
+      <a:effectLst>
+        <a:outerShdw dist="25400" dir="2700000" algn="tl" rotWithShape="0">
+          <a:schemeClr val="phClr"/>
+        </a:outerShdw>
+      </a:effectLst>
+    </cs:spPr>
+  </cs:dataPointLine>
+  <cs:dataPointMarker>
+    <cs:lnRef idx="0"/>
+    <cs:fillRef idx="0">
+      <cs:styleClr val="auto"/>
+    </cs:fillRef>
+    <cs:effectRef idx="0"/>
+    <cs:fontRef idx="minor">
+      <a:schemeClr val="dk1"/>
+    </cs:fontRef>
+    <cs:spPr>
+      <a:solidFill>
+        <a:schemeClr val="phClr"/>
+      </a:solidFill>
+      <a:ln w="22225">
+        <a:solidFill>
+          <a:schemeClr val="lt1"/>
+        </a:solidFill>
+        <a:round/>
+      </a:ln>
+    </cs:spPr>
+  </cs:dataPointMarker>
+  <cs:dataPointMarkerLayout symbol="circle" size="6"/>
+  <cs:dataPointWireframe>
+    <cs:lnRef idx="0">
+      <cs:styleClr val="auto"/>
+    </cs:lnRef>
+    <cs:fillRef idx="0"/>
+    <cs:effectRef idx="0"/>
+    <cs:fontRef idx="minor">
+      <a:schemeClr val="dk1"/>
+    </cs:fontRef>
+    <cs:spPr>
+      <a:ln w="9525" cap="rnd">
+        <a:solidFill>
+          <a:schemeClr val="phClr"/>
+        </a:solidFill>
+        <a:round/>
+      </a:ln>
+    </cs:spPr>
+  </cs:dataPointWireframe>
+  <cs:dataTable>
+    <cs:lnRef idx="0">
+      <cs:styleClr val="0"/>
+    </cs:lnRef>
+    <cs:fillRef idx="0"/>
+    <cs:effectRef idx="0"/>
+    <cs:fontRef idx="minor">
+      <a:schemeClr val="lt1"/>
+    </cs:fontRef>
+    <cs:spPr>
+      <a:ln w="9525">
+        <a:solidFill>
+          <a:schemeClr val="phClr">
+            <a:lumMod val="60000"/>
+            <a:lumOff val="40000"/>
+          </a:schemeClr>
+        </a:solidFill>
+      </a:ln>
+    </cs:spPr>
+    <cs:defRPr sz="900" kern="1200"/>
+  </cs:dataTable>
+  <cs:downBar>
+    <cs:lnRef idx="0">
+      <cs:styleClr val="0"/>
+    </cs:lnRef>
+    <cs:fillRef idx="0"/>
+    <cs:effectRef idx="0"/>
+    <cs:fontRef idx="minor">
+      <a:schemeClr val="dk1"/>
+    </cs:fontRef>
+    <cs:spPr>
+      <a:solidFill>
+        <a:schemeClr val="dk1">
+          <a:lumMod val="35000"/>
+          <a:lumOff val="65000"/>
+        </a:schemeClr>
+      </a:solidFill>
+      <a:ln w="9525">
+        <a:solidFill>
+          <a:schemeClr val="phClr">
+            <a:lumMod val="60000"/>
+            <a:lumOff val="40000"/>
+          </a:schemeClr>
+        </a:solidFill>
+      </a:ln>
+    </cs:spPr>
+  </cs:downBar>
+  <cs:dropLine>
+    <cs:lnRef idx="0">
+      <cs:styleClr val="0"/>
+    </cs:lnRef>
+    <cs:fillRef idx="0"/>
+    <cs:effectRef idx="0"/>
+    <cs:fontRef idx="minor">
+      <a:schemeClr val="dk1"/>
+    </cs:fontRef>
+    <cs:spPr>
+      <a:ln w="9525" cap="flat" cmpd="sng" algn="ctr">
+        <a:gradFill>
+          <a:gsLst>
+            <a:gs pos="79000">
+              <a:schemeClr val="phClr"/>
+            </a:gs>
+            <a:gs pos="0">
+              <a:schemeClr val="lt1">
+                <a:alpha val="60000"/>
+              </a:schemeClr>
+            </a:gs>
+          </a:gsLst>
+          <a:lin ang="5400000" scaled="0"/>
+        </a:gradFill>
+        <a:round/>
+      </a:ln>
+    </cs:spPr>
+  </cs:dropLine>
+  <cs:errorBar>
+    <cs:lnRef idx="0">
+      <cs:styleClr val="0"/>
+    </cs:lnRef>
+    <cs:fillRef idx="0"/>
+    <cs:effectRef idx="0"/>
+    <cs:fontRef idx="minor">
+      <a:schemeClr val="dk1"/>
+    </cs:fontRef>
+    <cs:spPr>
+      <a:ln w="9525">
+        <a:solidFill>
+          <a:schemeClr val="phClr">
+            <a:lumMod val="60000"/>
+            <a:lumOff val="40000"/>
+          </a:schemeClr>
+        </a:solidFill>
+        <a:round/>
+      </a:ln>
+      <a:effectLst>
+        <a:glow rad="25400">
+          <a:schemeClr val="lt1"/>
+        </a:glow>
+      </a:effectLst>
+    </cs:spPr>
+  </cs:errorBar>
+  <cs:floor>
+    <cs:lnRef idx="0"/>
+    <cs:fillRef idx="0"/>
+    <cs:effectRef idx="0"/>
+    <cs:fontRef idx="minor">
+      <a:schemeClr val="dk1"/>
+    </cs:fontRef>
+  </cs:floor>
+  <cs:gridlineMajor>
+    <cs:lnRef idx="0">
+      <cs:styleClr val="0"/>
+    </cs:lnRef>
+    <cs:fillRef idx="0"/>
+    <cs:effectRef idx="0"/>
+    <cs:fontRef idx="minor">
+      <a:schemeClr val="dk1"/>
+    </cs:fontRef>
+    <cs:spPr>
+      <a:ln w="9525" cap="flat" cmpd="sng" algn="ctr">
+        <a:solidFill>
+          <a:schemeClr val="lt1">
+            <a:alpha val="25000"/>
+          </a:schemeClr>
+        </a:solidFill>
+        <a:round/>
+      </a:ln>
+    </cs:spPr>
+  </cs:gridlineMajor>
+  <cs:gridlineMinor>
+    <cs:lnRef idx="0">
+      <cs:styleClr val="0"/>
+    </cs:lnRef>
+    <cs:fillRef idx="0"/>
+    <cs:effectRef idx="0"/>
+    <cs:fontRef idx="minor">
+      <a:schemeClr val="dk1"/>
+    </cs:fontRef>
+    <cs:spPr>
+      <a:ln>
+        <a:solidFill>
+          <a:schemeClr val="lt1">
+            <a:alpha val="10000"/>
+          </a:schemeClr>
+        </a:solidFill>
+      </a:ln>
+    </cs:spPr>
+  </cs:gridlineMinor>
+  <cs:hiLoLine>
+    <cs:lnRef idx="0">
+      <cs:styleClr val="0"/>
+    </cs:lnRef>
+    <cs:fillRef idx="0"/>
+    <cs:effectRef idx="0"/>
+    <cs:fontRef idx="minor">
+      <a:schemeClr val="dk1"/>
+    </cs:fontRef>
+    <cs:spPr>
+      <a:ln w="9525">
+        <a:solidFill>
+          <a:schemeClr val="phClr">
+            <a:lumMod val="60000"/>
+            <a:lumOff val="40000"/>
+          </a:schemeClr>
+        </a:solidFill>
+        <a:prstDash val="dash"/>
+      </a:ln>
+    </cs:spPr>
+  </cs:hiLoLine>
+  <cs:leaderLine>
+    <cs:lnRef idx="0">
+      <cs:styleClr val="0"/>
+    </cs:lnRef>
+    <cs:fillRef idx="0"/>
+    <cs:effectRef idx="0"/>
+    <cs:fontRef idx="minor">
+      <a:schemeClr val="dk1"/>
+    </cs:fontRef>
+    <cs:spPr>
+      <a:ln w="9525">
+        <a:solidFill>
+          <a:schemeClr val="phClr">
+            <a:lumMod val="60000"/>
+            <a:lumOff val="40000"/>
+          </a:schemeClr>
+        </a:solidFill>
+      </a:ln>
+    </cs:spPr>
+  </cs:leaderLine>
+  <cs:legend>
+    <cs:lnRef idx="0"/>
+    <cs:fillRef idx="0"/>
+    <cs:effectRef idx="0"/>
+    <cs:fontRef idx="minor">
+      <a:schemeClr val="lt1"/>
+    </cs:fontRef>
+    <cs:defRPr sz="900" kern="1200"/>
+  </cs:legend>
+  <cs:plotArea>
+    <cs:lnRef idx="0"/>
+    <cs:fillRef idx="0"/>
+    <cs:effectRef idx="0"/>
+    <cs:fontRef idx="minor">
+      <a:schemeClr val="dk1"/>
+    </cs:fontRef>
+  </cs:plotArea>
+  <cs:plotArea3D>
+    <cs:lnRef idx="0"/>
+    <cs:fillRef idx="0"/>
+    <cs:effectRef idx="0"/>
+    <cs:fontRef idx="minor">
+      <a:schemeClr val="dk1"/>
+    </cs:fontRef>
+  </cs:plotArea3D>
+  <cs:seriesAxis>
+    <cs:lnRef idx="0">
+      <cs:styleClr val="0"/>
+    </cs:lnRef>
+    <cs:fillRef idx="0"/>
+    <cs:effectRef idx="0"/>
+    <cs:fontRef idx="minor">
+      <a:schemeClr val="lt1"/>
+    </cs:fontRef>
+    <cs:spPr>
+      <a:ln w="3175" cap="flat" cmpd="sng" algn="ctr">
+        <a:solidFill>
+          <a:schemeClr val="phClr">
+            <a:lumMod val="60000"/>
+            <a:lumOff val="40000"/>
+          </a:schemeClr>
+        </a:solidFill>
+        <a:round/>
+      </a:ln>
+    </cs:spPr>
+    <cs:defRPr sz="900" kern="1200"/>
+  </cs:seriesAxis>
+  <cs:seriesLine>
+    <cs:lnRef idx="0">
+      <cs:styleClr val="0"/>
+    </cs:lnRef>
+    <cs:fillRef idx="0"/>
+    <cs:effectRef idx="0"/>
+    <cs:fontRef idx="minor">
+      <a:schemeClr val="dk1"/>
+    </cs:fontRef>
+    <cs:spPr>
+      <a:ln w="9525">
+        <a:solidFill>
+          <a:schemeClr val="phClr">
+            <a:lumMod val="60000"/>
+            <a:lumOff val="40000"/>
+            <a:tint val="50000"/>
+          </a:schemeClr>
+        </a:solidFill>
+        <a:prstDash val="dash"/>
+      </a:ln>
+    </cs:spPr>
+  </cs:seriesLine>
+  <cs:title>
+    <cs:lnRef idx="0"/>
+    <cs:fillRef idx="0"/>
+    <cs:effectRef idx="0"/>
+    <cs:fontRef idx="minor">
+      <a:schemeClr val="lt1"/>
+    </cs:fontRef>
+    <cs:defRPr sz="1500" b="1" kern="1200" cap="all" spc="100" normalizeH="0" baseline="0"/>
+  </cs:title>
+  <cs:trendline>
+    <cs:lnRef idx="0"/>
+    <cs:fillRef idx="0"/>
+    <cs:effectRef idx="0"/>
+    <cs:fontRef idx="minor">
+      <a:schemeClr val="dk1"/>
+    </cs:fontRef>
+    <cs:spPr>
+      <a:ln w="28575" cap="rnd">
+        <a:solidFill>
+          <a:schemeClr val="lt1">
+            <a:alpha val="50000"/>
+          </a:schemeClr>
+        </a:solidFill>
+        <a:round/>
+      </a:ln>
+    </cs:spPr>
+  </cs:trendline>
+  <cs:trendlineLabel>
+    <cs:lnRef idx="0"/>
+    <cs:fillRef idx="0"/>
+    <cs:effectRef idx="0"/>
+    <cs:fontRef idx="minor">
+      <a:schemeClr val="lt1"/>
+    </cs:fontRef>
+    <cs:defRPr sz="900" kern="1200"/>
+  </cs:trendlineLabel>
+  <cs:upBar>
+    <cs:lnRef idx="0">
+      <cs:styleClr val="0"/>
+    </cs:lnRef>
+    <cs:fillRef idx="0"/>
+    <cs:effectRef idx="0"/>
+    <cs:fontRef idx="minor">
+      <a:schemeClr val="dk1"/>
+    </cs:fontRef>
+    <cs:spPr>
+      <a:solidFill>
+        <a:schemeClr val="lt1">
+          <a:lumMod val="95000"/>
+        </a:schemeClr>
+      </a:solidFill>
+      <a:ln w="9525">
+        <a:solidFill>
+          <a:schemeClr val="phClr">
+            <a:lumMod val="60000"/>
+            <a:lumOff val="40000"/>
+          </a:schemeClr>
+        </a:solidFill>
+      </a:ln>
+    </cs:spPr>
+  </cs:upBar>
+  <cs:valueAxis>
+    <cs:lnRef idx="0"/>
+    <cs:fillRef idx="0"/>
+    <cs:effectRef idx="0"/>
+    <cs:fontRef idx="minor">
+      <a:schemeClr val="lt1"/>
+    </cs:fontRef>
+    <cs:defRPr sz="900" kern="1200"/>
+  </cs:valueAxis>
+  <cs:wall>
+    <cs:lnRef idx="0"/>
+    <cs:fillRef idx="0"/>
+    <cs:effectRef idx="0"/>
+    <cs:fontRef idx="minor">
+      <a:schemeClr val="dk1"/>
+    </cs:fontRef>
+  </cs:wall>
+</cs:chartStyle>
 </file>
 
 <file path=ppt/slideLayouts/slideLayout1.xml><?xml version="1.0" encoding="utf-8"?>
@@ -259,7 +2065,7 @@
           <a:p>
             <a:fld id="{08BC7CD8-7863-4FBC-AD1F-C96AE50BF8D2}" type="datetimeFigureOut">
               <a:rPr lang="es-ES" smtClean="0"/>
-              <a:t>15/07/2022</a:t>
+              <a:t>26/07/2022</a:t>
             </a:fld>
             <a:endParaRPr lang="es-ES"/>
           </a:p>
@@ -459,7 +2265,7 @@
           <a:p>
             <a:fld id="{08BC7CD8-7863-4FBC-AD1F-C96AE50BF8D2}" type="datetimeFigureOut">
               <a:rPr lang="es-ES" smtClean="0"/>
-              <a:t>15/07/2022</a:t>
+              <a:t>26/07/2022</a:t>
             </a:fld>
             <a:endParaRPr lang="es-ES"/>
           </a:p>
@@ -669,7 +2475,7 @@
           <a:p>
             <a:fld id="{08BC7CD8-7863-4FBC-AD1F-C96AE50BF8D2}" type="datetimeFigureOut">
               <a:rPr lang="es-ES" smtClean="0"/>
-              <a:t>15/07/2022</a:t>
+              <a:t>26/07/2022</a:t>
             </a:fld>
             <a:endParaRPr lang="es-ES"/>
           </a:p>
@@ -869,7 +2675,7 @@
           <a:p>
             <a:fld id="{08BC7CD8-7863-4FBC-AD1F-C96AE50BF8D2}" type="datetimeFigureOut">
               <a:rPr lang="es-ES" smtClean="0"/>
-              <a:t>15/07/2022</a:t>
+              <a:t>26/07/2022</a:t>
             </a:fld>
             <a:endParaRPr lang="es-ES"/>
           </a:p>
@@ -1145,7 +2951,7 @@
           <a:p>
             <a:fld id="{08BC7CD8-7863-4FBC-AD1F-C96AE50BF8D2}" type="datetimeFigureOut">
               <a:rPr lang="es-ES" smtClean="0"/>
-              <a:t>15/07/2022</a:t>
+              <a:t>26/07/2022</a:t>
             </a:fld>
             <a:endParaRPr lang="es-ES"/>
           </a:p>
@@ -1413,7 +3219,7 @@
           <a:p>
             <a:fld id="{08BC7CD8-7863-4FBC-AD1F-C96AE50BF8D2}" type="datetimeFigureOut">
               <a:rPr lang="es-ES" smtClean="0"/>
-              <a:t>15/07/2022</a:t>
+              <a:t>26/07/2022</a:t>
             </a:fld>
             <a:endParaRPr lang="es-ES"/>
           </a:p>
@@ -1828,7 +3634,7 @@
           <a:p>
             <a:fld id="{08BC7CD8-7863-4FBC-AD1F-C96AE50BF8D2}" type="datetimeFigureOut">
               <a:rPr lang="es-ES" smtClean="0"/>
-              <a:t>15/07/2022</a:t>
+              <a:t>26/07/2022</a:t>
             </a:fld>
             <a:endParaRPr lang="es-ES"/>
           </a:p>
@@ -1970,7 +3776,7 @@
           <a:p>
             <a:fld id="{08BC7CD8-7863-4FBC-AD1F-C96AE50BF8D2}" type="datetimeFigureOut">
               <a:rPr lang="es-ES" smtClean="0"/>
-              <a:t>15/07/2022</a:t>
+              <a:t>26/07/2022</a:t>
             </a:fld>
             <a:endParaRPr lang="es-ES"/>
           </a:p>
@@ -2083,7 +3889,7 @@
           <a:p>
             <a:fld id="{08BC7CD8-7863-4FBC-AD1F-C96AE50BF8D2}" type="datetimeFigureOut">
               <a:rPr lang="es-ES" smtClean="0"/>
-              <a:t>15/07/2022</a:t>
+              <a:t>26/07/2022</a:t>
             </a:fld>
             <a:endParaRPr lang="es-ES"/>
           </a:p>
@@ -2396,7 +4202,7 @@
           <a:p>
             <a:fld id="{08BC7CD8-7863-4FBC-AD1F-C96AE50BF8D2}" type="datetimeFigureOut">
               <a:rPr lang="es-ES" smtClean="0"/>
-              <a:t>15/07/2022</a:t>
+              <a:t>26/07/2022</a:t>
             </a:fld>
             <a:endParaRPr lang="es-ES"/>
           </a:p>
@@ -2685,7 +4491,7 @@
           <a:p>
             <a:fld id="{08BC7CD8-7863-4FBC-AD1F-C96AE50BF8D2}" type="datetimeFigureOut">
               <a:rPr lang="es-ES" smtClean="0"/>
-              <a:t>15/07/2022</a:t>
+              <a:t>26/07/2022</a:t>
             </a:fld>
             <a:endParaRPr lang="es-ES"/>
           </a:p>
@@ -2928,7 +4734,7 @@
           <a:p>
             <a:fld id="{08BC7CD8-7863-4FBC-AD1F-C96AE50BF8D2}" type="datetimeFigureOut">
               <a:rPr lang="es-ES" smtClean="0"/>
-              <a:t>15/07/2022</a:t>
+              <a:t>26/07/2022</a:t>
             </a:fld>
             <a:endParaRPr lang="es-ES"/>
           </a:p>
@@ -3494,11 +5300,27 @@
             </a:r>
             <a:r>
               <a:rPr lang="es-ES" dirty="0"/>
-              <a:t> no son capaces de procesar texto, son algoritmos </a:t>
+              <a:t> no son capaces de </a:t>
             </a:r>
             <a:r>
               <a:rPr lang="es-ES" b="1" dirty="0"/>
-              <a:t>numéricos</a:t>
+              <a:t>entender </a:t>
+            </a:r>
+            <a:r>
+              <a:rPr lang="es-ES" dirty="0"/>
+              <a:t>texto, son algoritmos </a:t>
+            </a:r>
+            <a:r>
+              <a:rPr lang="es-ES" b="1" dirty="0"/>
+              <a:t>numéricos </a:t>
+            </a:r>
+            <a:r>
+              <a:rPr lang="es-ES" dirty="0"/>
+              <a:t>(números y booleanos).</a:t>
+            </a:r>
+            <a:r>
+              <a:rPr lang="es-ES" b="1" dirty="0"/>
+              <a:t> </a:t>
             </a:r>
           </a:p>
           <a:p>
@@ -3763,8 +5585,8 @@
           </a:p>
         </p:txBody>
       </p:sp>
-      <mc:AlternateContent xmlns:mc="http://schemas.openxmlformats.org/markup-compatibility/2006">
-        <mc:Choice xmlns:a14="http://schemas.microsoft.com/office/drawing/2010/main" Requires="a14">
+      <mc:AlternateContent xmlns:mc="http://schemas.openxmlformats.org/markup-compatibility/2006" xmlns:a14="http://schemas.microsoft.com/office/drawing/2010/main">
+        <mc:Choice Requires="a14">
           <p:sp>
             <p:nvSpPr>
               <p:cNvPr id="3" name="Content Placeholder 2">
@@ -3812,7 +5634,7 @@
                 </a:r>
                 <a:r>
                   <a:rPr lang="es-ES" dirty="0"/>
-                  <a:t> (TF IDF) se encarga de asignar a una palabra que aparece en un documento un </a:t>
+                  <a:t> (TF IDF) se encarga de asignar a cada palabra que aparece en un documento un </a:t>
                 </a:r>
                 <a:r>
                   <a:rPr lang="es-ES" b="1" dirty="0"/>
@@ -3820,7 +5642,7 @@
                 </a:r>
                 <a:r>
                   <a:rPr lang="es-ES" dirty="0"/>
-                  <a:t>que representa la importancia que tiene la palabra en el documento</a:t>
+                  <a:t>que representa la importancia que tiene dentro del texto.</a:t>
                 </a:r>
               </a:p>
               <a:p>
@@ -4198,7 +6020,7 @@
             </p:txBody>
           </p:sp>
         </mc:Choice>
-        <mc:Fallback>
+        <mc:Fallback xmlns="">
           <p:sp>
             <p:nvSpPr>
               <p:cNvPr id="3" name="Content Placeholder 2">
@@ -4242,6 +6064,1266 @@
     <p:extLst>
       <p:ext uri="{BB962C8B-B14F-4D97-AF65-F5344CB8AC3E}">
         <p14:creationId xmlns:p14="http://schemas.microsoft.com/office/powerpoint/2010/main" val="2634120822"/>
+      </p:ext>
+    </p:extLst>
+  </p:cSld>
+  <p:clrMapOvr>
+    <a:masterClrMapping/>
+  </p:clrMapOvr>
+</p:sld>
+</file>
+
+<file path=ppt/slides/slide5.xml><?xml version="1.0" encoding="utf-8"?>
+<p:sld xmlns:a="http://schemas.openxmlformats.org/drawingml/2006/main" xmlns:r="http://schemas.openxmlformats.org/officeDocument/2006/relationships" xmlns:p="http://schemas.openxmlformats.org/presentationml/2006/main">
+  <p:cSld>
+    <p:spTree>
+      <p:nvGrpSpPr>
+        <p:cNvPr id="1" name=""/>
+        <p:cNvGrpSpPr/>
+        <p:nvPr/>
+      </p:nvGrpSpPr>
+      <p:grpSpPr>
+        <a:xfrm>
+          <a:off x="0" y="0"/>
+          <a:ext cx="0" cy="0"/>
+          <a:chOff x="0" y="0"/>
+          <a:chExt cx="0" cy="0"/>
+        </a:xfrm>
+      </p:grpSpPr>
+      <p:sp>
+        <p:nvSpPr>
+          <p:cNvPr id="2" name="Title 1">
+            <a:extLst>
+              <a:ext uri="{FF2B5EF4-FFF2-40B4-BE49-F238E27FC236}">
+                <a16:creationId xmlns:a16="http://schemas.microsoft.com/office/drawing/2014/main" id="{10D17B99-F77D-CDE7-40CC-CE7469585A49}"/>
+              </a:ext>
+            </a:extLst>
+          </p:cNvPr>
+          <p:cNvSpPr>
+            <a:spLocks noGrp="1"/>
+          </p:cNvSpPr>
+          <p:nvPr>
+            <p:ph type="title"/>
+          </p:nvPr>
+        </p:nvSpPr>
+        <p:spPr/>
+        <p:txBody>
+          <a:bodyPr/>
+          <a:lstStyle/>
+          <a:p>
+            <a:r>
+              <a:rPr lang="es-ES" dirty="0"/>
+              <a:t>TF IDF</a:t>
+            </a:r>
+          </a:p>
+        </p:txBody>
+      </p:sp>
+      <p:sp>
+        <p:nvSpPr>
+          <p:cNvPr id="3" name="Content Placeholder 2">
+            <a:extLst>
+              <a:ext uri="{FF2B5EF4-FFF2-40B4-BE49-F238E27FC236}">
+                <a16:creationId xmlns:a16="http://schemas.microsoft.com/office/drawing/2014/main" id="{4932E500-AA1F-FB7A-3564-95D7DAA676ED}"/>
+              </a:ext>
+            </a:extLst>
+          </p:cNvPr>
+          <p:cNvSpPr>
+            <a:spLocks noGrp="1"/>
+          </p:cNvSpPr>
+          <p:nvPr>
+            <p:ph idx="1"/>
+          </p:nvPr>
+        </p:nvSpPr>
+        <p:spPr>
+          <a:xfrm>
+            <a:off x="838200" y="1825625"/>
+            <a:ext cx="4120299" cy="4351338"/>
+          </a:xfrm>
+        </p:spPr>
+        <p:txBody>
+          <a:bodyPr/>
+          <a:lstStyle/>
+          <a:p>
+            <a:pPr marL="0" indent="0">
+              <a:buNone/>
+            </a:pPr>
+            <a:r>
+              <a:rPr lang="es-ES_tradnl" dirty="0"/>
+              <a:t>La información pasa de estar estructurada como una lista de documentos…</a:t>
+            </a:r>
+          </a:p>
+          <a:p>
+            <a:pPr marL="0" indent="0">
+              <a:buNone/>
+            </a:pPr>
+            <a:r>
+              <a:rPr lang="es-ES_tradnl" dirty="0"/>
+              <a:t>[[doc1.txt],</a:t>
+            </a:r>
+          </a:p>
+          <a:p>
+            <a:pPr marL="0" indent="0">
+              <a:buNone/>
+            </a:pPr>
+            <a:r>
+              <a:rPr lang="es-ES_tradnl" dirty="0"/>
+              <a:t> [doc2.txt],</a:t>
+            </a:r>
+          </a:p>
+          <a:p>
+            <a:pPr marL="0" indent="0">
+              <a:buNone/>
+            </a:pPr>
+            <a:r>
+              <a:rPr lang="es-ES_tradnl" dirty="0"/>
+              <a:t>[doc3.txt],…]</a:t>
+            </a:r>
+            <a:endParaRPr lang="es-ES" dirty="0"/>
+          </a:p>
+        </p:txBody>
+      </p:sp>
+      <p:sp>
+        <p:nvSpPr>
+          <p:cNvPr id="4" name="Content Placeholder 2">
+            <a:extLst>
+              <a:ext uri="{FF2B5EF4-FFF2-40B4-BE49-F238E27FC236}">
+                <a16:creationId xmlns:a16="http://schemas.microsoft.com/office/drawing/2014/main" id="{10FE8B53-3B83-4AC9-983E-07CF139B8E9E}"/>
+              </a:ext>
+            </a:extLst>
+          </p:cNvPr>
+          <p:cNvSpPr txBox="1">
+            <a:spLocks/>
+          </p:cNvSpPr>
+          <p:nvPr/>
+        </p:nvSpPr>
+        <p:spPr>
+          <a:xfrm>
+            <a:off x="6096000" y="1825625"/>
+            <a:ext cx="5257800" cy="4351338"/>
+          </a:xfrm>
+          <a:prstGeom prst="rect">
+            <a:avLst/>
+          </a:prstGeom>
+        </p:spPr>
+        <p:txBody>
+          <a:bodyPr vert="horz" lIns="91440" tIns="45720" rIns="91440" bIns="45720" rtlCol="0">
+            <a:normAutofit/>
+          </a:bodyPr>
+          <a:lstStyle>
+            <a:lvl1pPr marL="228600" indent="-228600" algn="l" defTabSz="914400" rtl="0" eaLnBrk="1" latinLnBrk="0" hangingPunct="1">
+              <a:lnSpc>
+                <a:spcPct val="90000"/>
+              </a:lnSpc>
+              <a:spcBef>
+                <a:spcPts val="1000"/>
+              </a:spcBef>
+              <a:buFont typeface="Arial" panose="020B0604020202020204" pitchFamily="34" charset="0"/>
+              <a:buChar char="•"/>
+              <a:defRPr sz="2800" kern="1200">
+                <a:solidFill>
+                  <a:schemeClr val="tx1"/>
+                </a:solidFill>
+                <a:latin typeface="+mn-lt"/>
+                <a:ea typeface="+mn-ea"/>
+                <a:cs typeface="+mn-cs"/>
+              </a:defRPr>
+            </a:lvl1pPr>
+            <a:lvl2pPr marL="685800" indent="-228600" algn="l" defTabSz="914400" rtl="0" eaLnBrk="1" latinLnBrk="0" hangingPunct="1">
+              <a:lnSpc>
+                <a:spcPct val="90000"/>
+              </a:lnSpc>
+              <a:spcBef>
+                <a:spcPts val="500"/>
+              </a:spcBef>
+              <a:buFont typeface="Arial" panose="020B0604020202020204" pitchFamily="34" charset="0"/>
+              <a:buChar char="•"/>
+              <a:defRPr sz="2400" kern="1200">
+                <a:solidFill>
+                  <a:schemeClr val="tx1"/>
+                </a:solidFill>
+                <a:latin typeface="+mn-lt"/>
+                <a:ea typeface="+mn-ea"/>
+                <a:cs typeface="+mn-cs"/>
+              </a:defRPr>
+            </a:lvl2pPr>
+            <a:lvl3pPr marL="1143000" indent="-228600" algn="l" defTabSz="914400" rtl="0" eaLnBrk="1" latinLnBrk="0" hangingPunct="1">
+              <a:lnSpc>
+                <a:spcPct val="90000"/>
+              </a:lnSpc>
+              <a:spcBef>
+                <a:spcPts val="500"/>
+              </a:spcBef>
+              <a:buFont typeface="Arial" panose="020B0604020202020204" pitchFamily="34" charset="0"/>
+              <a:buChar char="•"/>
+              <a:defRPr sz="2000" kern="1200">
+                <a:solidFill>
+                  <a:schemeClr val="tx1"/>
+                </a:solidFill>
+                <a:latin typeface="+mn-lt"/>
+                <a:ea typeface="+mn-ea"/>
+                <a:cs typeface="+mn-cs"/>
+              </a:defRPr>
+            </a:lvl3pPr>
+            <a:lvl4pPr marL="1600200" indent="-228600" algn="l" defTabSz="914400" rtl="0" eaLnBrk="1" latinLnBrk="0" hangingPunct="1">
+              <a:lnSpc>
+                <a:spcPct val="90000"/>
+              </a:lnSpc>
+              <a:spcBef>
+                <a:spcPts val="500"/>
+              </a:spcBef>
+              <a:buFont typeface="Arial" panose="020B0604020202020204" pitchFamily="34" charset="0"/>
+              <a:buChar char="•"/>
+              <a:defRPr sz="1800" kern="1200">
+                <a:solidFill>
+                  <a:schemeClr val="tx1"/>
+                </a:solidFill>
+                <a:latin typeface="+mn-lt"/>
+                <a:ea typeface="+mn-ea"/>
+                <a:cs typeface="+mn-cs"/>
+              </a:defRPr>
+            </a:lvl4pPr>
+            <a:lvl5pPr marL="2057400" indent="-228600" algn="l" defTabSz="914400" rtl="0" eaLnBrk="1" latinLnBrk="0" hangingPunct="1">
+              <a:lnSpc>
+                <a:spcPct val="90000"/>
+              </a:lnSpc>
+              <a:spcBef>
+                <a:spcPts val="500"/>
+              </a:spcBef>
+              <a:buFont typeface="Arial" panose="020B0604020202020204" pitchFamily="34" charset="0"/>
+              <a:buChar char="•"/>
+              <a:defRPr sz="1800" kern="1200">
+                <a:solidFill>
+                  <a:schemeClr val="tx1"/>
+                </a:solidFill>
+                <a:latin typeface="+mn-lt"/>
+                <a:ea typeface="+mn-ea"/>
+                <a:cs typeface="+mn-cs"/>
+              </a:defRPr>
+            </a:lvl5pPr>
+            <a:lvl6pPr marL="2514600" indent="-228600" algn="l" defTabSz="914400" rtl="0" eaLnBrk="1" latinLnBrk="0" hangingPunct="1">
+              <a:lnSpc>
+                <a:spcPct val="90000"/>
+              </a:lnSpc>
+              <a:spcBef>
+                <a:spcPts val="500"/>
+              </a:spcBef>
+              <a:buFont typeface="Arial" panose="020B0604020202020204" pitchFamily="34" charset="0"/>
+              <a:buChar char="•"/>
+              <a:defRPr sz="1800" kern="1200">
+                <a:solidFill>
+                  <a:schemeClr val="tx1"/>
+                </a:solidFill>
+                <a:latin typeface="+mn-lt"/>
+                <a:ea typeface="+mn-ea"/>
+                <a:cs typeface="+mn-cs"/>
+              </a:defRPr>
+            </a:lvl6pPr>
+            <a:lvl7pPr marL="2971800" indent="-228600" algn="l" defTabSz="914400" rtl="0" eaLnBrk="1" latinLnBrk="0" hangingPunct="1">
+              <a:lnSpc>
+                <a:spcPct val="90000"/>
+              </a:lnSpc>
+              <a:spcBef>
+                <a:spcPts val="500"/>
+              </a:spcBef>
+              <a:buFont typeface="Arial" panose="020B0604020202020204" pitchFamily="34" charset="0"/>
+              <a:buChar char="•"/>
+              <a:defRPr sz="1800" kern="1200">
+                <a:solidFill>
+                  <a:schemeClr val="tx1"/>
+                </a:solidFill>
+                <a:latin typeface="+mn-lt"/>
+                <a:ea typeface="+mn-ea"/>
+                <a:cs typeface="+mn-cs"/>
+              </a:defRPr>
+            </a:lvl7pPr>
+            <a:lvl8pPr marL="3429000" indent="-228600" algn="l" defTabSz="914400" rtl="0" eaLnBrk="1" latinLnBrk="0" hangingPunct="1">
+              <a:lnSpc>
+                <a:spcPct val="90000"/>
+              </a:lnSpc>
+              <a:spcBef>
+                <a:spcPts val="500"/>
+              </a:spcBef>
+              <a:buFont typeface="Arial" panose="020B0604020202020204" pitchFamily="34" charset="0"/>
+              <a:buChar char="•"/>
+              <a:defRPr sz="1800" kern="1200">
+                <a:solidFill>
+                  <a:schemeClr val="tx1"/>
+                </a:solidFill>
+                <a:latin typeface="+mn-lt"/>
+                <a:ea typeface="+mn-ea"/>
+                <a:cs typeface="+mn-cs"/>
+              </a:defRPr>
+            </a:lvl8pPr>
+            <a:lvl9pPr marL="3886200" indent="-228600" algn="l" defTabSz="914400" rtl="0" eaLnBrk="1" latinLnBrk="0" hangingPunct="1">
+              <a:lnSpc>
+                <a:spcPct val="90000"/>
+              </a:lnSpc>
+              <a:spcBef>
+                <a:spcPts val="500"/>
+              </a:spcBef>
+              <a:buFont typeface="Arial" panose="020B0604020202020204" pitchFamily="34" charset="0"/>
+              <a:buChar char="•"/>
+              <a:defRPr sz="1800" kern="1200">
+                <a:solidFill>
+                  <a:schemeClr val="tx1"/>
+                </a:solidFill>
+                <a:latin typeface="+mn-lt"/>
+                <a:ea typeface="+mn-ea"/>
+                <a:cs typeface="+mn-cs"/>
+              </a:defRPr>
+            </a:lvl9pPr>
+          </a:lstStyle>
+          <a:p>
+            <a:pPr marL="0" indent="0">
+              <a:buFont typeface="Arial" panose="020B0604020202020204" pitchFamily="34" charset="0"/>
+              <a:buNone/>
+            </a:pPr>
+            <a:r>
+              <a:rPr lang="es-ES_tradnl" dirty="0"/>
+              <a:t>A ser una </a:t>
+            </a:r>
+            <a:r>
+              <a:rPr lang="es-ES_tradnl" b="1" dirty="0"/>
+              <a:t>matriz </a:t>
+            </a:r>
+            <a:r>
+              <a:rPr lang="es-ES_tradnl" dirty="0"/>
+              <a:t>de palabras y frecuencia (más de 10000 columnas) normalizadas.</a:t>
+            </a:r>
+          </a:p>
+        </p:txBody>
+      </p:sp>
+      <p:pic>
+        <p:nvPicPr>
+          <p:cNvPr id="5" name="Picture 4">
+            <a:extLst>
+              <a:ext uri="{FF2B5EF4-FFF2-40B4-BE49-F238E27FC236}">
+                <a16:creationId xmlns:a16="http://schemas.microsoft.com/office/drawing/2014/main" id="{9059A484-10B1-4F0F-A5CB-4CFF026B21D6}"/>
+              </a:ext>
+            </a:extLst>
+          </p:cNvPr>
+          <p:cNvPicPr>
+            <a:picLocks noChangeAspect="1"/>
+          </p:cNvPicPr>
+          <p:nvPr/>
+        </p:nvPicPr>
+        <p:blipFill>
+          <a:blip r:embed="rId2"/>
+          <a:stretch>
+            <a:fillRect/>
+          </a:stretch>
+        </p:blipFill>
+        <p:spPr>
+          <a:xfrm>
+            <a:off x="6388231" y="4001294"/>
+            <a:ext cx="4282440" cy="762000"/>
+          </a:xfrm>
+          <a:prstGeom prst="rect">
+            <a:avLst/>
+          </a:prstGeom>
+        </p:spPr>
+      </p:pic>
+      <p:sp>
+        <p:nvSpPr>
+          <p:cNvPr id="6" name="Arrow: Right 5">
+            <a:extLst>
+              <a:ext uri="{FF2B5EF4-FFF2-40B4-BE49-F238E27FC236}">
+                <a16:creationId xmlns:a16="http://schemas.microsoft.com/office/drawing/2014/main" id="{6202331B-78A7-4ACD-A2E9-312B46B437E0}"/>
+              </a:ext>
+            </a:extLst>
+          </p:cNvPr>
+          <p:cNvSpPr/>
+          <p:nvPr/>
+        </p:nvSpPr>
+        <p:spPr>
+          <a:xfrm>
+            <a:off x="4788817" y="2083324"/>
+            <a:ext cx="970960" cy="509047"/>
+          </a:xfrm>
+          <a:prstGeom prst="rightArrow">
+            <a:avLst/>
+          </a:prstGeom>
+        </p:spPr>
+        <p:style>
+          <a:lnRef idx="2">
+            <a:schemeClr val="accent1">
+              <a:shade val="50000"/>
+            </a:schemeClr>
+          </a:lnRef>
+          <a:fillRef idx="1">
+            <a:schemeClr val="accent1"/>
+          </a:fillRef>
+          <a:effectRef idx="0">
+            <a:schemeClr val="accent1"/>
+          </a:effectRef>
+          <a:fontRef idx="minor">
+            <a:schemeClr val="lt1"/>
+          </a:fontRef>
+        </p:style>
+        <p:txBody>
+          <a:bodyPr rtlCol="0" anchor="ctr"/>
+          <a:lstStyle/>
+          <a:p>
+            <a:pPr algn="ctr"/>
+            <a:endParaRPr lang="es-ES"/>
+          </a:p>
+        </p:txBody>
+      </p:sp>
+    </p:spTree>
+    <p:extLst>
+      <p:ext uri="{BB962C8B-B14F-4D97-AF65-F5344CB8AC3E}">
+        <p14:creationId xmlns:p14="http://schemas.microsoft.com/office/powerpoint/2010/main" val="4070933729"/>
+      </p:ext>
+    </p:extLst>
+  </p:cSld>
+  <p:clrMapOvr>
+    <a:masterClrMapping/>
+  </p:clrMapOvr>
+</p:sld>
+</file>
+
+<file path=ppt/slides/slide6.xml><?xml version="1.0" encoding="utf-8"?>
+<p:sld xmlns:a="http://schemas.openxmlformats.org/drawingml/2006/main" xmlns:r="http://schemas.openxmlformats.org/officeDocument/2006/relationships" xmlns:p="http://schemas.openxmlformats.org/presentationml/2006/main">
+  <p:cSld>
+    <p:spTree>
+      <p:nvGrpSpPr>
+        <p:cNvPr id="1" name=""/>
+        <p:cNvGrpSpPr/>
+        <p:nvPr/>
+      </p:nvGrpSpPr>
+      <p:grpSpPr>
+        <a:xfrm>
+          <a:off x="0" y="0"/>
+          <a:ext cx="0" cy="0"/>
+          <a:chOff x="0" y="0"/>
+          <a:chExt cx="0" cy="0"/>
+        </a:xfrm>
+      </p:grpSpPr>
+      <p:sp>
+        <p:nvSpPr>
+          <p:cNvPr id="2" name="Title 1">
+            <a:extLst>
+              <a:ext uri="{FF2B5EF4-FFF2-40B4-BE49-F238E27FC236}">
+                <a16:creationId xmlns:a16="http://schemas.microsoft.com/office/drawing/2014/main" id="{34945F48-44C1-4318-950F-71F889350CD3}"/>
+              </a:ext>
+            </a:extLst>
+          </p:cNvPr>
+          <p:cNvSpPr>
+            <a:spLocks noGrp="1"/>
+          </p:cNvSpPr>
+          <p:nvPr>
+            <p:ph type="title"/>
+          </p:nvPr>
+        </p:nvSpPr>
+        <p:spPr/>
+        <p:txBody>
+          <a:bodyPr/>
+          <a:lstStyle/>
+          <a:p>
+            <a:r>
+              <a:rPr lang="es-ES_tradnl" dirty="0"/>
+              <a:t>Clasificador </a:t>
+            </a:r>
+            <a:r>
+              <a:rPr lang="es-ES_tradnl" dirty="0" err="1"/>
+              <a:t>Naive</a:t>
+            </a:r>
+            <a:r>
+              <a:rPr lang="es-ES_tradnl" dirty="0"/>
+              <a:t>-Bayes</a:t>
+            </a:r>
+            <a:endParaRPr lang="es-ES" dirty="0"/>
+          </a:p>
+        </p:txBody>
+      </p:sp>
+      <p:sp>
+        <p:nvSpPr>
+          <p:cNvPr id="3" name="Content Placeholder 2">
+            <a:extLst>
+              <a:ext uri="{FF2B5EF4-FFF2-40B4-BE49-F238E27FC236}">
+                <a16:creationId xmlns:a16="http://schemas.microsoft.com/office/drawing/2014/main" id="{9A7EEF91-EB71-458D-96D6-313A37F9798D}"/>
+              </a:ext>
+            </a:extLst>
+          </p:cNvPr>
+          <p:cNvSpPr>
+            <a:spLocks noGrp="1"/>
+          </p:cNvSpPr>
+          <p:nvPr>
+            <p:ph idx="1"/>
+          </p:nvPr>
+        </p:nvSpPr>
+        <p:spPr>
+          <a:xfrm>
+            <a:off x="838200" y="1825625"/>
+            <a:ext cx="10805160" cy="4351338"/>
+          </a:xfrm>
+        </p:spPr>
+        <p:txBody>
+          <a:bodyPr>
+            <a:normAutofit/>
+          </a:bodyPr>
+          <a:lstStyle/>
+          <a:p>
+            <a:r>
+              <a:rPr lang="es-ES_tradnl" dirty="0"/>
+              <a:t>Una vez </a:t>
+            </a:r>
+            <a:r>
+              <a:rPr lang="es-ES_tradnl" b="1" dirty="0"/>
+              <a:t>vectorizada </a:t>
+            </a:r>
+            <a:r>
+              <a:rPr lang="es-ES_tradnl" dirty="0"/>
+              <a:t>(transformada a valores numéricos) la información, se puede procesar con un algoritmo de Machine </a:t>
+            </a:r>
+            <a:r>
+              <a:rPr lang="es-ES_tradnl" dirty="0" err="1"/>
+              <a:t>Learning</a:t>
+            </a:r>
+            <a:r>
+              <a:rPr lang="es-ES_tradnl" dirty="0"/>
+              <a:t> para buscar </a:t>
+            </a:r>
+            <a:r>
+              <a:rPr lang="es-ES_tradnl" b="1" dirty="0"/>
+              <a:t>patrones</a:t>
+            </a:r>
+            <a:r>
+              <a:rPr lang="es-ES_tradnl" dirty="0"/>
+              <a:t> o </a:t>
+            </a:r>
+            <a:r>
+              <a:rPr lang="es-ES_tradnl" b="1" dirty="0"/>
+              <a:t>criterios de clasificación</a:t>
+            </a:r>
+            <a:r>
+              <a:rPr lang="es-ES_tradnl" dirty="0"/>
+              <a:t>.</a:t>
+            </a:r>
+          </a:p>
+          <a:p>
+            <a:r>
+              <a:rPr lang="es-ES_tradnl" dirty="0" err="1"/>
+              <a:t>Naive</a:t>
+            </a:r>
+            <a:r>
+              <a:rPr lang="es-ES_tradnl" dirty="0"/>
+              <a:t>-Bayes es un criterio de clasificación estadístico que </a:t>
+            </a:r>
+            <a:r>
+              <a:rPr lang="es-ES_tradnl" b="1" dirty="0"/>
+              <a:t>no requiere entrenamiento </a:t>
+            </a:r>
+            <a:r>
+              <a:rPr lang="es-ES_tradnl" dirty="0"/>
+              <a:t>y funciona bien para clasificación de texto. </a:t>
+            </a:r>
+            <a:endParaRPr lang="es-ES" dirty="0"/>
+          </a:p>
+        </p:txBody>
+      </p:sp>
+    </p:spTree>
+    <p:extLst>
+      <p:ext uri="{BB962C8B-B14F-4D97-AF65-F5344CB8AC3E}">
+        <p14:creationId xmlns:p14="http://schemas.microsoft.com/office/powerpoint/2010/main" val="131332469"/>
+      </p:ext>
+    </p:extLst>
+  </p:cSld>
+  <p:clrMapOvr>
+    <a:masterClrMapping/>
+  </p:clrMapOvr>
+</p:sld>
+</file>
+
+<file path=ppt/slides/slide7.xml><?xml version="1.0" encoding="utf-8"?>
+<p:sld xmlns:a="http://schemas.openxmlformats.org/drawingml/2006/main" xmlns:r="http://schemas.openxmlformats.org/officeDocument/2006/relationships" xmlns:p="http://schemas.openxmlformats.org/presentationml/2006/main">
+  <p:cSld>
+    <p:bg>
+      <p:bgPr>
+        <a:solidFill>
+          <a:schemeClr val="bg1"/>
+        </a:solidFill>
+        <a:effectLst/>
+      </p:bgPr>
+    </p:bg>
+    <p:spTree>
+      <p:nvGrpSpPr>
+        <p:cNvPr id="1" name=""/>
+        <p:cNvGrpSpPr/>
+        <p:nvPr/>
+      </p:nvGrpSpPr>
+      <p:grpSpPr>
+        <a:xfrm>
+          <a:off x="0" y="0"/>
+          <a:ext cx="0" cy="0"/>
+          <a:chOff x="0" y="0"/>
+          <a:chExt cx="0" cy="0"/>
+        </a:xfrm>
+      </p:grpSpPr>
+      <p:sp useBgFill="1">
+        <p:nvSpPr>
+          <p:cNvPr id="21" name="Rectangle 20">
+            <a:extLst>
+              <a:ext uri="{FF2B5EF4-FFF2-40B4-BE49-F238E27FC236}">
+                <a16:creationId xmlns:a16="http://schemas.microsoft.com/office/drawing/2014/main" id="{2E442304-DDBD-4F7B-8017-36BCC863FB40}"/>
+              </a:ext>
+              <a:ext uri="{C183D7F6-B498-43B3-948B-1728B52AA6E4}">
+                <adec:decorative xmlns:adec="http://schemas.microsoft.com/office/drawing/2017/decorative" val="1"/>
+              </a:ext>
+            </a:extLst>
+          </p:cNvPr>
+          <p:cNvSpPr>
+            <a:spLocks noGrp="1" noRot="1" noChangeAspect="1" noMove="1" noResize="1" noEditPoints="1" noAdjustHandles="1" noChangeArrowheads="1" noChangeShapeType="1" noTextEdit="1"/>
+          </p:cNvSpPr>
+          <p:nvPr>
+            <p:extLst>
+              <p:ext uri="{386F3935-93C4-4BCD-93E2-E3B085C9AB24}">
+                <p16:designElem xmlns:p16="http://schemas.microsoft.com/office/powerpoint/2015/main" val="1"/>
+              </p:ext>
+            </p:extLst>
+          </p:nvPr>
+        </p:nvSpPr>
+        <p:spPr>
+          <a:xfrm>
+            <a:off x="0" y="0"/>
+            <a:ext cx="12188952" cy="6858000"/>
+          </a:xfrm>
+          <a:prstGeom prst="rect">
+            <a:avLst/>
+          </a:prstGeom>
+          <a:ln>
+            <a:noFill/>
+          </a:ln>
+        </p:spPr>
+        <p:style>
+          <a:lnRef idx="2">
+            <a:schemeClr val="accent1">
+              <a:shade val="50000"/>
+            </a:schemeClr>
+          </a:lnRef>
+          <a:fillRef idx="1">
+            <a:schemeClr val="accent1"/>
+          </a:fillRef>
+          <a:effectRef idx="0">
+            <a:schemeClr val="accent1"/>
+          </a:effectRef>
+          <a:fontRef idx="minor">
+            <a:schemeClr val="lt1"/>
+          </a:fontRef>
+        </p:style>
+        <p:txBody>
+          <a:bodyPr rtlCol="0" anchor="ctr"/>
+          <a:lstStyle/>
+          <a:p>
+            <a:pPr algn="ctr"/>
+            <a:endParaRPr lang="en-US"/>
+          </a:p>
+        </p:txBody>
+      </p:sp>
+      <p:sp>
+        <p:nvSpPr>
+          <p:cNvPr id="2" name="Title 1">
+            <a:extLst>
+              <a:ext uri="{FF2B5EF4-FFF2-40B4-BE49-F238E27FC236}">
+                <a16:creationId xmlns:a16="http://schemas.microsoft.com/office/drawing/2014/main" id="{E4127E96-0A87-48E2-8AF7-35DAF7183833}"/>
+              </a:ext>
+            </a:extLst>
+          </p:cNvPr>
+          <p:cNvSpPr>
+            <a:spLocks noGrp="1"/>
+          </p:cNvSpPr>
+          <p:nvPr>
+            <p:ph type="title"/>
+          </p:nvPr>
+        </p:nvSpPr>
+        <p:spPr>
+          <a:xfrm>
+            <a:off x="635000" y="640823"/>
+            <a:ext cx="3418659" cy="282813"/>
+          </a:xfrm>
+        </p:spPr>
+        <p:txBody>
+          <a:bodyPr anchor="ctr">
+            <a:normAutofit fontScale="90000"/>
+          </a:bodyPr>
+          <a:lstStyle/>
+          <a:p>
+            <a:r>
+              <a:rPr lang="es-ES_tradnl" sz="5400" dirty="0" err="1"/>
+              <a:t>Naive</a:t>
+            </a:r>
+            <a:r>
+              <a:rPr lang="es-ES_tradnl" sz="5400" dirty="0"/>
+              <a:t>-Bayes</a:t>
+            </a:r>
+            <a:endParaRPr lang="es-ES" sz="5400" dirty="0"/>
+          </a:p>
+        </p:txBody>
+      </p:sp>
+      <p:sp>
+        <p:nvSpPr>
+          <p:cNvPr id="23" name="sketch line">
+            <a:extLst>
+              <a:ext uri="{FF2B5EF4-FFF2-40B4-BE49-F238E27FC236}">
+                <a16:creationId xmlns:a16="http://schemas.microsoft.com/office/drawing/2014/main" id="{5E107275-3853-46FD-A241-DE4355A42675}"/>
+              </a:ext>
+              <a:ext uri="{C183D7F6-B498-43B3-948B-1728B52AA6E4}">
+                <adec:decorative xmlns:adec="http://schemas.microsoft.com/office/drawing/2017/decorative" val="1"/>
+              </a:ext>
+            </a:extLst>
+          </p:cNvPr>
+          <p:cNvSpPr>
+            <a:spLocks noGrp="1" noRot="1" noChangeAspect="1" noMove="1" noResize="1" noEditPoints="1" noAdjustHandles="1" noChangeArrowheads="1" noChangeShapeType="1" noTextEdit="1"/>
+          </p:cNvSpPr>
+          <p:nvPr>
+            <p:extLst>
+              <p:ext uri="{386F3935-93C4-4BCD-93E2-E3B085C9AB24}">
+                <p16:designElem xmlns:p16="http://schemas.microsoft.com/office/powerpoint/2015/main" val="1"/>
+              </p:ext>
+            </p:extLst>
+          </p:nvPr>
+        </p:nvSpPr>
+        <p:spPr>
+          <a:xfrm rot="5400000">
+            <a:off x="1627450" y="3462719"/>
+            <a:ext cx="5410200" cy="18288"/>
+          </a:xfrm>
+          <a:custGeom>
+            <a:avLst/>
+            <a:gdLst>
+              <a:gd name="connsiteX0" fmla="*/ 0 w 5410200"/>
+              <a:gd name="connsiteY0" fmla="*/ 0 h 18288"/>
+              <a:gd name="connsiteX1" fmla="*/ 568071 w 5410200"/>
+              <a:gd name="connsiteY1" fmla="*/ 0 h 18288"/>
+              <a:gd name="connsiteX2" fmla="*/ 1298448 w 5410200"/>
+              <a:gd name="connsiteY2" fmla="*/ 0 h 18288"/>
+              <a:gd name="connsiteX3" fmla="*/ 1920621 w 5410200"/>
+              <a:gd name="connsiteY3" fmla="*/ 0 h 18288"/>
+              <a:gd name="connsiteX4" fmla="*/ 2488692 w 5410200"/>
+              <a:gd name="connsiteY4" fmla="*/ 0 h 18288"/>
+              <a:gd name="connsiteX5" fmla="*/ 3219069 w 5410200"/>
+              <a:gd name="connsiteY5" fmla="*/ 0 h 18288"/>
+              <a:gd name="connsiteX6" fmla="*/ 3895344 w 5410200"/>
+              <a:gd name="connsiteY6" fmla="*/ 0 h 18288"/>
+              <a:gd name="connsiteX7" fmla="*/ 4571619 w 5410200"/>
+              <a:gd name="connsiteY7" fmla="*/ 0 h 18288"/>
+              <a:gd name="connsiteX8" fmla="*/ 5410200 w 5410200"/>
+              <a:gd name="connsiteY8" fmla="*/ 0 h 18288"/>
+              <a:gd name="connsiteX9" fmla="*/ 5410200 w 5410200"/>
+              <a:gd name="connsiteY9" fmla="*/ 18288 h 18288"/>
+              <a:gd name="connsiteX10" fmla="*/ 4842129 w 5410200"/>
+              <a:gd name="connsiteY10" fmla="*/ 18288 h 18288"/>
+              <a:gd name="connsiteX11" fmla="*/ 4328160 w 5410200"/>
+              <a:gd name="connsiteY11" fmla="*/ 18288 h 18288"/>
+              <a:gd name="connsiteX12" fmla="*/ 3597783 w 5410200"/>
+              <a:gd name="connsiteY12" fmla="*/ 18288 h 18288"/>
+              <a:gd name="connsiteX13" fmla="*/ 3029712 w 5410200"/>
+              <a:gd name="connsiteY13" fmla="*/ 18288 h 18288"/>
+              <a:gd name="connsiteX14" fmla="*/ 2299335 w 5410200"/>
+              <a:gd name="connsiteY14" fmla="*/ 18288 h 18288"/>
+              <a:gd name="connsiteX15" fmla="*/ 1514856 w 5410200"/>
+              <a:gd name="connsiteY15" fmla="*/ 18288 h 18288"/>
+              <a:gd name="connsiteX16" fmla="*/ 892683 w 5410200"/>
+              <a:gd name="connsiteY16" fmla="*/ 18288 h 18288"/>
+              <a:gd name="connsiteX17" fmla="*/ 0 w 5410200"/>
+              <a:gd name="connsiteY17" fmla="*/ 18288 h 18288"/>
+              <a:gd name="connsiteX18" fmla="*/ 0 w 5410200"/>
+              <a:gd name="connsiteY18" fmla="*/ 0 h 18288"/>
+            </a:gdLst>
+            <a:ahLst/>
+            <a:cxnLst>
+              <a:cxn ang="0">
+                <a:pos x="connsiteX0" y="connsiteY0"/>
+              </a:cxn>
+              <a:cxn ang="0">
+                <a:pos x="connsiteX1" y="connsiteY1"/>
+              </a:cxn>
+              <a:cxn ang="0">
+                <a:pos x="connsiteX2" y="connsiteY2"/>
+              </a:cxn>
+              <a:cxn ang="0">
+                <a:pos x="connsiteX3" y="connsiteY3"/>
+              </a:cxn>
+              <a:cxn ang="0">
+                <a:pos x="connsiteX4" y="connsiteY4"/>
+              </a:cxn>
+              <a:cxn ang="0">
+                <a:pos x="connsiteX5" y="connsiteY5"/>
+              </a:cxn>
+              <a:cxn ang="0">
+                <a:pos x="connsiteX6" y="connsiteY6"/>
+              </a:cxn>
+              <a:cxn ang="0">
+                <a:pos x="connsiteX7" y="connsiteY7"/>
+              </a:cxn>
+              <a:cxn ang="0">
+                <a:pos x="connsiteX8" y="connsiteY8"/>
+              </a:cxn>
+              <a:cxn ang="0">
+                <a:pos x="connsiteX9" y="connsiteY9"/>
+              </a:cxn>
+              <a:cxn ang="0">
+                <a:pos x="connsiteX10" y="connsiteY10"/>
+              </a:cxn>
+              <a:cxn ang="0">
+                <a:pos x="connsiteX11" y="connsiteY11"/>
+              </a:cxn>
+              <a:cxn ang="0">
+                <a:pos x="connsiteX12" y="connsiteY12"/>
+              </a:cxn>
+              <a:cxn ang="0">
+                <a:pos x="connsiteX13" y="connsiteY13"/>
+              </a:cxn>
+              <a:cxn ang="0">
+                <a:pos x="connsiteX14" y="connsiteY14"/>
+              </a:cxn>
+              <a:cxn ang="0">
+                <a:pos x="connsiteX15" y="connsiteY15"/>
+              </a:cxn>
+              <a:cxn ang="0">
+                <a:pos x="connsiteX16" y="connsiteY16"/>
+              </a:cxn>
+              <a:cxn ang="0">
+                <a:pos x="connsiteX17" y="connsiteY17"/>
+              </a:cxn>
+              <a:cxn ang="0">
+                <a:pos x="connsiteX18" y="connsiteY18"/>
+              </a:cxn>
+            </a:cxnLst>
+            <a:rect l="l" t="t" r="r" b="b"/>
+            <a:pathLst>
+              <a:path w="5410200" h="18288" fill="none" extrusionOk="0">
+                <a:moveTo>
+                  <a:pt x="0" y="0"/>
+                </a:moveTo>
+                <a:cubicBezTo>
+                  <a:pt x="163050" y="-18707"/>
+                  <a:pt x="319321" y="-16364"/>
+                  <a:pt x="568071" y="0"/>
+                </a:cubicBezTo>
+                <a:cubicBezTo>
+                  <a:pt x="816821" y="16364"/>
+                  <a:pt x="1013224" y="-7268"/>
+                  <a:pt x="1298448" y="0"/>
+                </a:cubicBezTo>
+                <a:cubicBezTo>
+                  <a:pt x="1583672" y="7268"/>
+                  <a:pt x="1631711" y="-3367"/>
+                  <a:pt x="1920621" y="0"/>
+                </a:cubicBezTo>
+                <a:cubicBezTo>
+                  <a:pt x="2209531" y="3367"/>
+                  <a:pt x="2364420" y="-19184"/>
+                  <a:pt x="2488692" y="0"/>
+                </a:cubicBezTo>
+                <a:cubicBezTo>
+                  <a:pt x="2612964" y="19184"/>
+                  <a:pt x="3023298" y="-34627"/>
+                  <a:pt x="3219069" y="0"/>
+                </a:cubicBezTo>
+                <a:cubicBezTo>
+                  <a:pt x="3414840" y="34627"/>
+                  <a:pt x="3656810" y="24043"/>
+                  <a:pt x="3895344" y="0"/>
+                </a:cubicBezTo>
+                <a:cubicBezTo>
+                  <a:pt x="4133879" y="-24043"/>
+                  <a:pt x="4393984" y="-19577"/>
+                  <a:pt x="4571619" y="0"/>
+                </a:cubicBezTo>
+                <a:cubicBezTo>
+                  <a:pt x="4749255" y="19577"/>
+                  <a:pt x="5179928" y="-6281"/>
+                  <a:pt x="5410200" y="0"/>
+                </a:cubicBezTo>
+                <a:cubicBezTo>
+                  <a:pt x="5410730" y="6954"/>
+                  <a:pt x="5410934" y="12839"/>
+                  <a:pt x="5410200" y="18288"/>
+                </a:cubicBezTo>
+                <a:cubicBezTo>
+                  <a:pt x="5139060" y="6751"/>
+                  <a:pt x="5121593" y="31035"/>
+                  <a:pt x="4842129" y="18288"/>
+                </a:cubicBezTo>
+                <a:cubicBezTo>
+                  <a:pt x="4562665" y="5541"/>
+                  <a:pt x="4448273" y="9487"/>
+                  <a:pt x="4328160" y="18288"/>
+                </a:cubicBezTo>
+                <a:cubicBezTo>
+                  <a:pt x="4208047" y="27089"/>
+                  <a:pt x="3760936" y="22567"/>
+                  <a:pt x="3597783" y="18288"/>
+                </a:cubicBezTo>
+                <a:cubicBezTo>
+                  <a:pt x="3434630" y="14009"/>
+                  <a:pt x="3299718" y="33213"/>
+                  <a:pt x="3029712" y="18288"/>
+                </a:cubicBezTo>
+                <a:cubicBezTo>
+                  <a:pt x="2759706" y="3363"/>
+                  <a:pt x="2640159" y="27394"/>
+                  <a:pt x="2299335" y="18288"/>
+                </a:cubicBezTo>
+                <a:cubicBezTo>
+                  <a:pt x="1958511" y="9182"/>
+                  <a:pt x="1801186" y="28985"/>
+                  <a:pt x="1514856" y="18288"/>
+                </a:cubicBezTo>
+                <a:cubicBezTo>
+                  <a:pt x="1228526" y="7591"/>
+                  <a:pt x="1063509" y="-5305"/>
+                  <a:pt x="892683" y="18288"/>
+                </a:cubicBezTo>
+                <a:cubicBezTo>
+                  <a:pt x="721857" y="41881"/>
+                  <a:pt x="186945" y="-20897"/>
+                  <a:pt x="0" y="18288"/>
+                </a:cubicBezTo>
+                <a:cubicBezTo>
+                  <a:pt x="-570" y="9279"/>
+                  <a:pt x="132" y="5100"/>
+                  <a:pt x="0" y="0"/>
+                </a:cubicBezTo>
+                <a:close/>
+              </a:path>
+              <a:path w="5410200" h="18288" stroke="0" extrusionOk="0">
+                <a:moveTo>
+                  <a:pt x="0" y="0"/>
+                </a:moveTo>
+                <a:cubicBezTo>
+                  <a:pt x="285096" y="-4925"/>
+                  <a:pt x="376456" y="22268"/>
+                  <a:pt x="622173" y="0"/>
+                </a:cubicBezTo>
+                <a:cubicBezTo>
+                  <a:pt x="867890" y="-22268"/>
+                  <a:pt x="1031392" y="7228"/>
+                  <a:pt x="1136142" y="0"/>
+                </a:cubicBezTo>
+                <a:cubicBezTo>
+                  <a:pt x="1240892" y="-7228"/>
+                  <a:pt x="1561853" y="9877"/>
+                  <a:pt x="1920621" y="0"/>
+                </a:cubicBezTo>
+                <a:cubicBezTo>
+                  <a:pt x="2279389" y="-9877"/>
+                  <a:pt x="2367255" y="19546"/>
+                  <a:pt x="2542794" y="0"/>
+                </a:cubicBezTo>
+                <a:cubicBezTo>
+                  <a:pt x="2718333" y="-19546"/>
+                  <a:pt x="2866732" y="-22226"/>
+                  <a:pt x="3164967" y="0"/>
+                </a:cubicBezTo>
+                <a:cubicBezTo>
+                  <a:pt x="3463202" y="22226"/>
+                  <a:pt x="3568055" y="-2765"/>
+                  <a:pt x="3949446" y="0"/>
+                </a:cubicBezTo>
+                <a:cubicBezTo>
+                  <a:pt x="4330837" y="2765"/>
+                  <a:pt x="4287895" y="10557"/>
+                  <a:pt x="4517517" y="0"/>
+                </a:cubicBezTo>
+                <a:cubicBezTo>
+                  <a:pt x="4747139" y="-10557"/>
+                  <a:pt x="5149588" y="8716"/>
+                  <a:pt x="5410200" y="0"/>
+                </a:cubicBezTo>
+                <a:cubicBezTo>
+                  <a:pt x="5409517" y="5414"/>
+                  <a:pt x="5409480" y="12510"/>
+                  <a:pt x="5410200" y="18288"/>
+                </a:cubicBezTo>
+                <a:cubicBezTo>
+                  <a:pt x="5163327" y="41494"/>
+                  <a:pt x="5008749" y="10693"/>
+                  <a:pt x="4842129" y="18288"/>
+                </a:cubicBezTo>
+                <a:cubicBezTo>
+                  <a:pt x="4675509" y="25883"/>
+                  <a:pt x="4433401" y="-615"/>
+                  <a:pt x="4165854" y="18288"/>
+                </a:cubicBezTo>
+                <a:cubicBezTo>
+                  <a:pt x="3898308" y="37191"/>
+                  <a:pt x="3809032" y="-8710"/>
+                  <a:pt x="3543681" y="18288"/>
+                </a:cubicBezTo>
+                <a:cubicBezTo>
+                  <a:pt x="3278330" y="45286"/>
+                  <a:pt x="3073876" y="-15917"/>
+                  <a:pt x="2759202" y="18288"/>
+                </a:cubicBezTo>
+                <a:cubicBezTo>
+                  <a:pt x="2444528" y="52493"/>
+                  <a:pt x="2204144" y="3372"/>
+                  <a:pt x="1974723" y="18288"/>
+                </a:cubicBezTo>
+                <a:cubicBezTo>
+                  <a:pt x="1745302" y="33204"/>
+                  <a:pt x="1602335" y="31490"/>
+                  <a:pt x="1406652" y="18288"/>
+                </a:cubicBezTo>
+                <a:cubicBezTo>
+                  <a:pt x="1210969" y="5086"/>
+                  <a:pt x="923948" y="3161"/>
+                  <a:pt x="730377" y="18288"/>
+                </a:cubicBezTo>
+                <a:cubicBezTo>
+                  <a:pt x="536806" y="33415"/>
+                  <a:pt x="336496" y="-141"/>
+                  <a:pt x="0" y="18288"/>
+                </a:cubicBezTo>
+                <a:cubicBezTo>
+                  <a:pt x="-306" y="11061"/>
+                  <a:pt x="-655" y="7751"/>
+                  <a:pt x="0" y="0"/>
+                </a:cubicBezTo>
+                <a:close/>
+              </a:path>
+            </a:pathLst>
+          </a:custGeom>
+          <a:solidFill>
+            <a:schemeClr val="accent2"/>
+          </a:solidFill>
+          <a:ln w="41275" cap="rnd">
+            <a:solidFill>
+              <a:schemeClr val="accent2"/>
+            </a:solidFill>
+            <a:round/>
+            <a:extLst>
+              <a:ext uri="{C807C97D-BFC1-408E-A445-0C87EB9F89A2}">
+                <ask:lineSketchStyleProps xmlns:ask="http://schemas.microsoft.com/office/drawing/2018/sketchyshapes" sd="1219033472">
+                  <a:prstGeom prst="rect">
+                    <a:avLst/>
+                  </a:prstGeom>
+                  <ask:type>
+                    <ask:lineSketchFreehand/>
+                  </ask:type>
+                </ask:lineSketchStyleProps>
+              </a:ext>
+            </a:extLst>
+          </a:ln>
+        </p:spPr>
+        <p:style>
+          <a:lnRef idx="2">
+            <a:schemeClr val="accent1">
+              <a:shade val="50000"/>
+            </a:schemeClr>
+          </a:lnRef>
+          <a:fillRef idx="1">
+            <a:schemeClr val="accent1"/>
+          </a:fillRef>
+          <a:effectRef idx="0">
+            <a:schemeClr val="accent1"/>
+          </a:effectRef>
+          <a:fontRef idx="minor">
+            <a:schemeClr val="lt1"/>
+          </a:fontRef>
+        </p:style>
+        <p:txBody>
+          <a:bodyPr rtlCol="0" anchor="ctr"/>
+          <a:lstStyle/>
+          <a:p>
+            <a:pPr algn="ctr"/>
+            <a:endParaRPr lang="en-US"/>
+          </a:p>
+        </p:txBody>
+      </p:sp>
+      <p:graphicFrame>
+        <p:nvGraphicFramePr>
+          <p:cNvPr id="4" name="Content Placeholder 3">
+            <a:extLst>
+              <a:ext uri="{FF2B5EF4-FFF2-40B4-BE49-F238E27FC236}">
+                <a16:creationId xmlns:a16="http://schemas.microsoft.com/office/drawing/2014/main" id="{1E9C84D1-CA63-4BB2-93B5-E4DFD12508EE}"/>
+              </a:ext>
+            </a:extLst>
+          </p:cNvPr>
+          <p:cNvGraphicFramePr>
+            <a:graphicFrameLocks noGrp="1"/>
+          </p:cNvGraphicFramePr>
+          <p:nvPr>
+            <p:ph idx="1"/>
+            <p:extLst>
+              <p:ext uri="{D42A27DB-BD31-4B8C-83A1-F6EECF244321}">
+                <p14:modId xmlns:p14="http://schemas.microsoft.com/office/powerpoint/2010/main" val="2597998373"/>
+              </p:ext>
+            </p:extLst>
+          </p:nvPr>
+        </p:nvGraphicFramePr>
+        <p:xfrm>
+          <a:off x="4648018" y="640822"/>
+          <a:ext cx="6900512" cy="5536141"/>
+        </p:xfrm>
+        <a:graphic>
+          <a:graphicData uri="http://schemas.openxmlformats.org/drawingml/2006/chart">
+            <c:chart xmlns:c="http://schemas.openxmlformats.org/drawingml/2006/chart" xmlns:r="http://schemas.openxmlformats.org/officeDocument/2006/relationships" r:id="rId2"/>
+          </a:graphicData>
+        </a:graphic>
+      </p:graphicFrame>
+      <p:sp>
+        <p:nvSpPr>
+          <p:cNvPr id="5" name="Oval 4">
+            <a:extLst>
+              <a:ext uri="{FF2B5EF4-FFF2-40B4-BE49-F238E27FC236}">
+                <a16:creationId xmlns:a16="http://schemas.microsoft.com/office/drawing/2014/main" id="{C9EF1006-A961-464B-B5D6-8EC33B61C4C8}"/>
+              </a:ext>
+            </a:extLst>
+          </p:cNvPr>
+          <p:cNvSpPr/>
+          <p:nvPr/>
+        </p:nvSpPr>
+        <p:spPr>
+          <a:xfrm>
+            <a:off x="7589520" y="2920366"/>
+            <a:ext cx="1143000" cy="1133474"/>
+          </a:xfrm>
+          <a:prstGeom prst="ellipse">
+            <a:avLst/>
+          </a:prstGeom>
+          <a:noFill/>
+          <a:ln w="38100">
+            <a:solidFill>
+              <a:srgbClr val="FFFF00"/>
+            </a:solidFill>
+          </a:ln>
+        </p:spPr>
+        <p:style>
+          <a:lnRef idx="2">
+            <a:schemeClr val="accent1">
+              <a:shade val="50000"/>
+            </a:schemeClr>
+          </a:lnRef>
+          <a:fillRef idx="1">
+            <a:schemeClr val="accent1"/>
+          </a:fillRef>
+          <a:effectRef idx="0">
+            <a:schemeClr val="accent1"/>
+          </a:effectRef>
+          <a:fontRef idx="minor">
+            <a:schemeClr val="lt1"/>
+          </a:fontRef>
+        </p:style>
+        <p:txBody>
+          <a:bodyPr rtlCol="0" anchor="ctr"/>
+          <a:lstStyle/>
+          <a:p>
+            <a:pPr algn="ctr"/>
+            <a:endParaRPr lang="es-ES"/>
+          </a:p>
+        </p:txBody>
+      </p:sp>
+      <p:sp>
+        <p:nvSpPr>
+          <p:cNvPr id="14" name="Oval 13">
+            <a:extLst>
+              <a:ext uri="{FF2B5EF4-FFF2-40B4-BE49-F238E27FC236}">
+                <a16:creationId xmlns:a16="http://schemas.microsoft.com/office/drawing/2014/main" id="{50313662-8E56-4B74-9ED2-BB31931DEE42}"/>
+              </a:ext>
+            </a:extLst>
+          </p:cNvPr>
+          <p:cNvSpPr/>
+          <p:nvPr/>
+        </p:nvSpPr>
+        <p:spPr>
+          <a:xfrm>
+            <a:off x="7117080" y="2447926"/>
+            <a:ext cx="2087880" cy="2078354"/>
+          </a:xfrm>
+          <a:prstGeom prst="ellipse">
+            <a:avLst/>
+          </a:prstGeom>
+          <a:noFill/>
+          <a:ln w="38100">
+            <a:solidFill>
+              <a:srgbClr val="FFFF00"/>
+            </a:solidFill>
+          </a:ln>
+        </p:spPr>
+        <p:style>
+          <a:lnRef idx="2">
+            <a:schemeClr val="accent1">
+              <a:shade val="50000"/>
+            </a:schemeClr>
+          </a:lnRef>
+          <a:fillRef idx="1">
+            <a:schemeClr val="accent1"/>
+          </a:fillRef>
+          <a:effectRef idx="0">
+            <a:schemeClr val="accent1"/>
+          </a:effectRef>
+          <a:fontRef idx="minor">
+            <a:schemeClr val="lt1"/>
+          </a:fontRef>
+        </p:style>
+        <p:txBody>
+          <a:bodyPr rtlCol="0" anchor="ctr"/>
+          <a:lstStyle/>
+          <a:p>
+            <a:pPr algn="ctr"/>
+            <a:endParaRPr lang="es-ES"/>
+          </a:p>
+        </p:txBody>
+      </p:sp>
+      <p:sp>
+        <p:nvSpPr>
+          <p:cNvPr id="17" name="Oval 16">
+            <a:extLst>
+              <a:ext uri="{FF2B5EF4-FFF2-40B4-BE49-F238E27FC236}">
+                <a16:creationId xmlns:a16="http://schemas.microsoft.com/office/drawing/2014/main" id="{47F44F11-920A-4109-AC03-5C200761E834}"/>
+              </a:ext>
+            </a:extLst>
+          </p:cNvPr>
+          <p:cNvSpPr/>
+          <p:nvPr/>
+        </p:nvSpPr>
+        <p:spPr>
+          <a:xfrm>
+            <a:off x="7848600" y="3156586"/>
+            <a:ext cx="624840" cy="661034"/>
+          </a:xfrm>
+          <a:prstGeom prst="ellipse">
+            <a:avLst/>
+          </a:prstGeom>
+          <a:noFill/>
+          <a:ln w="38100">
+            <a:solidFill>
+              <a:srgbClr val="FFFF00"/>
+            </a:solidFill>
+          </a:ln>
+        </p:spPr>
+        <p:style>
+          <a:lnRef idx="2">
+            <a:schemeClr val="accent1">
+              <a:shade val="50000"/>
+            </a:schemeClr>
+          </a:lnRef>
+          <a:fillRef idx="1">
+            <a:schemeClr val="accent1"/>
+          </a:fillRef>
+          <a:effectRef idx="0">
+            <a:schemeClr val="accent1"/>
+          </a:effectRef>
+          <a:fontRef idx="minor">
+            <a:schemeClr val="lt1"/>
+          </a:fontRef>
+        </p:style>
+        <p:txBody>
+          <a:bodyPr rtlCol="0" anchor="ctr"/>
+          <a:lstStyle/>
+          <a:p>
+            <a:pPr algn="ctr"/>
+            <a:endParaRPr lang="es-ES"/>
+          </a:p>
+        </p:txBody>
+      </p:sp>
+    </p:spTree>
+    <p:extLst>
+      <p:ext uri="{BB962C8B-B14F-4D97-AF65-F5344CB8AC3E}">
+        <p14:creationId xmlns:p14="http://schemas.microsoft.com/office/powerpoint/2010/main" val="3784313263"/>
       </p:ext>
     </p:extLst>
   </p:cSld>

</xml_diff>